<commit_message>
Made all variables italic
</commit_message>
<xml_diff>
--- a/Random Walk based Proximity Measures in Directed Graphs.pptx
+++ b/Random Walk based Proximity Measures in Directed Graphs.pptx
@@ -133,7 +133,7 @@
   </p:defaultTextStyle>
   <p:extLst>
     <p:ext uri="{EFAFB233-063F-42B5-8137-9DF3F51BA10A}">
-      <p15:sldGuideLst xmlns="" xmlns:p15="http://schemas.microsoft.com/office/powerpoint/2012/main">
+      <p15:sldGuideLst xmlns:p15="http://schemas.microsoft.com/office/powerpoint/2012/main">
         <p15:guide id="1" orient="horz" pos="2160">
           <p15:clr>
             <a:srgbClr val="A4A3A4"/>
@@ -232,7 +232,7 @@
           <a:p>
             <a:fld id="{68F1ED60-613F-4894-A100-A48BBD071A74}" type="datetimeFigureOut">
               <a:rPr lang="en-US" smtClean="0"/>
-              <a:t>22-Mar-17</a:t>
+              <a:t>3/22/17</a:t>
             </a:fld>
             <a:endParaRPr lang="en-US"/>
           </a:p>
@@ -7035,7 +7035,7 @@
           <a:graphicData uri="http://schemas.openxmlformats.org/presentationml/2006/ole">
             <mc:AlternateContent xmlns:mc="http://schemas.openxmlformats.org/markup-compatibility/2006">
               <mc:Choice xmlns:v="urn:schemas-microsoft-com:vml" Requires="v">
-                <p:oleObj spid="_x0000_s27686" name="Visio" r:id="rId9" imgW="5289194" imgH="1988515" progId="Visio.Drawing.11">
+                <p:oleObj spid="_x0000_s27987" name="Visio" r:id="rId9" imgW="5289194" imgH="1988515" progId="Visio.Drawing.11">
                   <p:embed/>
                 </p:oleObj>
               </mc:Choice>
@@ -7137,7 +7137,7 @@
           <a:graphicData uri="http://schemas.openxmlformats.org/presentationml/2006/ole">
             <mc:AlternateContent xmlns:mc="http://schemas.openxmlformats.org/markup-compatibility/2006">
               <mc:Choice xmlns:v="urn:schemas-microsoft-com:vml" Requires="v">
-                <p:oleObj spid="_x0000_s27687" name="Visio" r:id="rId11" imgW="5289194" imgH="2888590" progId="Visio.Drawing.11">
+                <p:oleObj spid="_x0000_s27988" name="Visio" r:id="rId11" imgW="5289194" imgH="2888590" progId="Visio.Drawing.11">
                   <p:embed/>
                 </p:oleObj>
               </mc:Choice>
@@ -7238,7 +7238,7 @@
           <a:graphicData uri="http://schemas.openxmlformats.org/presentationml/2006/ole">
             <mc:AlternateContent xmlns:mc="http://schemas.openxmlformats.org/markup-compatibility/2006">
               <mc:Choice xmlns:v="urn:schemas-microsoft-com:vml" Requires="v">
-                <p:oleObj spid="_x0000_s27688" name="Visio" r:id="rId13" imgW="5186172" imgH="754685" progId="Visio.Drawing.11">
+                <p:oleObj spid="_x0000_s27989" name="Visio" r:id="rId13" imgW="5186172" imgH="754685" progId="Visio.Drawing.11">
                   <p:embed/>
                 </p:oleObj>
               </mc:Choice>
@@ -7339,7 +7339,7 @@
           <a:graphicData uri="http://schemas.openxmlformats.org/presentationml/2006/ole">
             <mc:AlternateContent xmlns:mc="http://schemas.openxmlformats.org/markup-compatibility/2006">
               <mc:Choice xmlns:v="urn:schemas-microsoft-com:vml" Requires="v">
-                <p:oleObj spid="_x0000_s27689" name="Visio" r:id="rId15" imgW="5186172" imgH="1870558" progId="Visio.Drawing.11">
+                <p:oleObj spid="_x0000_s27990" name="Visio" r:id="rId15" imgW="5186172" imgH="1870558" progId="Visio.Drawing.11">
                   <p:embed/>
                 </p:oleObj>
               </mc:Choice>
@@ -7582,7 +7582,7 @@
         </p:nvSpPr>
         <p:spPr bwMode="auto">
           <a:xfrm>
-            <a:off x="4259262" y="990600"/>
+            <a:off x="4419600" y="986664"/>
             <a:ext cx="4732338" cy="498475"/>
           </a:xfrm>
           <a:prstGeom prst="rect">
@@ -7819,7 +7819,15 @@
                 <a:ea typeface="Open Sans" panose="020B0606030504020204" pitchFamily="34" charset="0"/>
                 <a:cs typeface="Open Sans" panose="020B0606030504020204" pitchFamily="34" charset="0"/>
               </a:rPr>
-              <a:t>Introduce an absorbing node</a:t>
+              <a:t>Adding </a:t>
+            </a:r>
+            <a:r>
+              <a:rPr lang="en-US" altLang="en-US" sz="2400" dirty="0" smtClean="0">
+                <a:latin typeface="Open Sans" panose="020B0606030504020204" pitchFamily="34" charset="0"/>
+                <a:ea typeface="Open Sans" panose="020B0606030504020204" pitchFamily="34" charset="0"/>
+                <a:cs typeface="Open Sans" panose="020B0606030504020204" pitchFamily="34" charset="0"/>
+              </a:rPr>
+              <a:t>an absorbing node</a:t>
             </a:r>
           </a:p>
           <a:p>
@@ -8571,7 +8579,7 @@
           <a:graphicData uri="http://schemas.openxmlformats.org/presentationml/2006/ole">
             <mc:AlternateContent xmlns:mc="http://schemas.openxmlformats.org/markup-compatibility/2006">
               <mc:Choice xmlns:v="urn:schemas-microsoft-com:vml" Requires="v">
-                <p:oleObj spid="_x0000_s1436" name="Visio" r:id="rId7" imgW="5038954" imgH="751637" progId="Visio.Drawing.11">
+                <p:oleObj spid="_x0000_s1587" name="Visio" r:id="rId7" imgW="5038954" imgH="751637" progId="Visio.Drawing.11">
                   <p:embed/>
                 </p:oleObj>
               </mc:Choice>
@@ -8726,7 +8734,7 @@
           <a:graphicData uri="http://schemas.openxmlformats.org/presentationml/2006/ole">
             <mc:AlternateContent xmlns:mc="http://schemas.openxmlformats.org/markup-compatibility/2006">
               <mc:Choice xmlns:v="urn:schemas-microsoft-com:vml" Requires="v">
-                <p:oleObj spid="_x0000_s1437" name="Visio" r:id="rId9" imgW="5038954" imgH="1130503" progId="Visio.Drawing.11">
+                <p:oleObj spid="_x0000_s1588" name="Visio" r:id="rId9" imgW="5038954" imgH="1130503" progId="Visio.Drawing.11">
                   <p:embed/>
                 </p:oleObj>
               </mc:Choice>
@@ -8815,7 +8823,7 @@
         </p:nvSpPr>
         <p:spPr bwMode="auto">
           <a:xfrm>
-            <a:off x="609600" y="3311525"/>
+            <a:off x="609600" y="3352800"/>
             <a:ext cx="3581400" cy="498475"/>
           </a:xfrm>
           <a:prstGeom prst="rect">
@@ -9357,7 +9365,15 @@
                 <a:ea typeface="Open Sans" panose="020B0606030504020204" pitchFamily="34" charset="0"/>
                 <a:cs typeface="Open Sans" panose="020B0606030504020204" pitchFamily="34" charset="0"/>
               </a:rPr>
-              <a:t>Solving ep(</a:t>
+              <a:t>Solving </a:t>
+            </a:r>
+            <a:r>
+              <a:rPr lang="en-US" altLang="en-US" sz="3200" b="1" dirty="0" smtClean="0">
+                <a:latin typeface="Open Sans" panose="020B0606030504020204" pitchFamily="34" charset="0"/>
+                <a:ea typeface="Open Sans" panose="020B0606030504020204" pitchFamily="34" charset="0"/>
+                <a:cs typeface="Open Sans" panose="020B0606030504020204" pitchFamily="34" charset="0"/>
+              </a:rPr>
+              <a:t>ep(</a:t>
             </a:r>
             <a:r>
               <a:rPr lang="en-US" altLang="en-US" sz="3200" b="1" dirty="0" err="1" smtClean="0">
@@ -9373,7 +9389,23 @@
                 <a:ea typeface="Open Sans" panose="020B0606030504020204" pitchFamily="34" charset="0"/>
                 <a:cs typeface="Open Sans" panose="020B0606030504020204" pitchFamily="34" charset="0"/>
               </a:rPr>
-              <a:t> -&gt; j)</a:t>
+              <a:t> -&gt; </a:t>
+            </a:r>
+            <a:r>
+              <a:rPr lang="en-US" altLang="en-US" sz="3200" b="1" dirty="0" smtClean="0">
+                <a:latin typeface="Open Sans" panose="020B0606030504020204" pitchFamily="34" charset="0"/>
+                <a:ea typeface="Open Sans" panose="020B0606030504020204" pitchFamily="34" charset="0"/>
+                <a:cs typeface="Open Sans" panose="020B0606030504020204" pitchFamily="34" charset="0"/>
+              </a:rPr>
+              <a:t>j</a:t>
+            </a:r>
+            <a:r>
+              <a:rPr lang="en-US" altLang="en-US" sz="3200" b="1" dirty="0" smtClean="0">
+                <a:latin typeface="Open Sans" panose="020B0606030504020204" pitchFamily="34" charset="0"/>
+                <a:ea typeface="Open Sans" panose="020B0606030504020204" pitchFamily="34" charset="0"/>
+                <a:cs typeface="Open Sans" panose="020B0606030504020204" pitchFamily="34" charset="0"/>
+              </a:rPr>
+              <a:t>)</a:t>
             </a:r>
             <a:endParaRPr lang="en-US" altLang="en-US" sz="3200" b="1" dirty="0">
               <a:latin typeface="Open Sans" panose="020B0606030504020204" pitchFamily="34" charset="0"/>
@@ -11473,11 +11505,6 @@
               </a:rPr>
               <a:t>proximity</a:t>
             </a:r>
-            <a:endParaRPr lang="en-US" altLang="zh-CN" sz="2400" dirty="0" smtClean="0">
-              <a:latin typeface="Open Sans" panose="020B0606030504020204" pitchFamily="34" charset="0"/>
-              <a:ea typeface="Open Sans" panose="020B0606030504020204" pitchFamily="34" charset="0"/>
-              <a:cs typeface="Open Sans" panose="020B0606030504020204" pitchFamily="34" charset="0"/>
-            </a:endParaRPr>
           </a:p>
           <a:p>
             <a:pPr lvl="1"/>
@@ -21053,7 +21080,7 @@
               <a:t>Q: Given a pair of nodes </a:t>
             </a:r>
             <a:r>
-              <a:rPr lang="en-US" altLang="en-US" sz="2400" kern="0" dirty="0" err="1" smtClean="0">
+              <a:rPr lang="en-US" altLang="en-US" sz="2400" i="1" kern="0" dirty="0" err="1" smtClean="0">
                 <a:latin typeface="Open Sans" charset="0"/>
                 <a:ea typeface="Open Sans" charset="0"/>
                 <a:cs typeface="Open Sans" charset="0"/>
@@ -21061,21 +21088,50 @@
               <a:t>i</a:t>
             </a:r>
             <a:r>
-              <a:rPr lang="en-US" altLang="en-US" sz="2400" kern="0" dirty="0">
-                <a:latin typeface="Open Sans" charset="0"/>
-                <a:ea typeface="Open Sans" charset="0"/>
-                <a:cs typeface="Open Sans" charset="0"/>
-              </a:rPr>
-              <a:t> </a:t>
-            </a:r>
-            <a:r>
               <a:rPr lang="en-US" altLang="en-US" sz="2400" kern="0" dirty="0" smtClean="0">
                 <a:latin typeface="Open Sans" charset="0"/>
                 <a:ea typeface="Open Sans" charset="0"/>
                 <a:cs typeface="Open Sans" charset="0"/>
               </a:rPr>
-              <a:t>and j, is there a link between j and j?</a:t>
-            </a:r>
+              <a:t> and </a:t>
+            </a:r>
+            <a:r>
+              <a:rPr lang="en-US" altLang="en-US" sz="2400" i="1" kern="0" dirty="0" smtClean="0">
+                <a:latin typeface="Open Sans" charset="0"/>
+                <a:ea typeface="Open Sans" charset="0"/>
+                <a:cs typeface="Open Sans" charset="0"/>
+              </a:rPr>
+              <a:t>j</a:t>
+            </a:r>
+            <a:r>
+              <a:rPr lang="en-US" altLang="en-US" sz="2400" kern="0" dirty="0" smtClean="0">
+                <a:latin typeface="Open Sans" charset="0"/>
+                <a:ea typeface="Open Sans" charset="0"/>
+                <a:cs typeface="Open Sans" charset="0"/>
+              </a:rPr>
+              <a:t>, </a:t>
+            </a:r>
+            <a:r>
+              <a:rPr lang="en-US" altLang="en-US" sz="2400" kern="0" dirty="0" smtClean="0">
+                <a:latin typeface="Open Sans" charset="0"/>
+                <a:ea typeface="Open Sans" charset="0"/>
+                <a:cs typeface="Open Sans" charset="0"/>
+              </a:rPr>
+              <a:t>is there a link between </a:t>
+            </a:r>
+            <a:r>
+              <a:rPr lang="en-US" altLang="en-US" sz="2400" kern="0" dirty="0" smtClean="0">
+                <a:latin typeface="Open Sans" charset="0"/>
+                <a:ea typeface="Open Sans" charset="0"/>
+                <a:cs typeface="Open Sans" charset="0"/>
+              </a:rPr>
+              <a:t>them?</a:t>
+            </a:r>
+            <a:endParaRPr lang="en-US" altLang="en-US" sz="2400" kern="0" dirty="0" smtClean="0">
+              <a:latin typeface="Open Sans" charset="0"/>
+              <a:ea typeface="Open Sans" charset="0"/>
+              <a:cs typeface="Open Sans" charset="0"/>
+            </a:endParaRPr>
           </a:p>
           <a:p>
             <a:r>
@@ -21347,7 +21403,7 @@
               <a:t>link between </a:t>
             </a:r>
             <a:r>
-              <a:rPr lang="en-US" altLang="en-US" sz="2400" dirty="0" err="1" smtClean="0">
+              <a:rPr lang="en-US" altLang="en-US" sz="2400" i="1" dirty="0" err="1" smtClean="0">
                 <a:latin typeface="Open Sans" charset="0"/>
                 <a:ea typeface="Open Sans" charset="0"/>
                 <a:cs typeface="Open Sans" charset="0"/>
@@ -21360,7 +21416,23 @@
                 <a:ea typeface="Open Sans" charset="0"/>
                 <a:cs typeface="Open Sans" charset="0"/>
               </a:rPr>
-              <a:t> and j, </a:t>
+              <a:t> and </a:t>
+            </a:r>
+            <a:r>
+              <a:rPr lang="en-US" altLang="en-US" sz="2400" i="1" dirty="0" smtClean="0">
+                <a:latin typeface="Open Sans" charset="0"/>
+                <a:ea typeface="Open Sans" charset="0"/>
+                <a:cs typeface="Open Sans" charset="0"/>
+              </a:rPr>
+              <a:t>j</a:t>
+            </a:r>
+            <a:r>
+              <a:rPr lang="en-US" altLang="en-US" sz="2400" dirty="0" smtClean="0">
+                <a:latin typeface="Open Sans" charset="0"/>
+                <a:ea typeface="Open Sans" charset="0"/>
+                <a:cs typeface="Open Sans" charset="0"/>
+              </a:rPr>
+              <a:t>, </a:t>
             </a:r>
             <a:r>
               <a:rPr lang="en-US" altLang="en-US" sz="2400" dirty="0">
@@ -24798,10 +24870,34 @@
                 <a:ea typeface="Open Sans" panose="020B0606030504020204" pitchFamily="34" charset="0"/>
                 <a:cs typeface="Open Sans" panose="020B0606030504020204" pitchFamily="34" charset="0"/>
               </a:rPr>
-              <a:t>Suppose the walk length is T, then the expected number it visits </a:t>
-            </a:r>
-            <a:r>
-              <a:rPr lang="en-US" sz="2000" dirty="0" err="1" smtClean="0">
+              <a:t>Suppose the walk length is </a:t>
+            </a:r>
+            <a:r>
+              <a:rPr lang="en-US" sz="2000" i="1" dirty="0" smtClean="0">
+                <a:latin typeface="Open Sans" panose="020B0606030504020204" pitchFamily="34" charset="0"/>
+                <a:ea typeface="Open Sans" panose="020B0606030504020204" pitchFamily="34" charset="0"/>
+                <a:cs typeface="Open Sans" panose="020B0606030504020204" pitchFamily="34" charset="0"/>
+              </a:rPr>
+              <a:t>T</a:t>
+            </a:r>
+            <a:r>
+              <a:rPr lang="en-US" sz="2000" dirty="0" smtClean="0">
+                <a:latin typeface="Open Sans" panose="020B0606030504020204" pitchFamily="34" charset="0"/>
+                <a:ea typeface="Open Sans" panose="020B0606030504020204" pitchFamily="34" charset="0"/>
+                <a:cs typeface="Open Sans" panose="020B0606030504020204" pitchFamily="34" charset="0"/>
+              </a:rPr>
+              <a:t>, then the expected number it visits </a:t>
+            </a:r>
+            <a:r>
+              <a:rPr lang="en-US" sz="2000" dirty="0" smtClean="0">
+                <a:latin typeface="Open Sans" panose="020B0606030504020204" pitchFamily="34" charset="0"/>
+                <a:ea typeface="Open Sans" panose="020B0606030504020204" pitchFamily="34" charset="0"/>
+                <a:cs typeface="Open Sans" panose="020B0606030504020204" pitchFamily="34" charset="0"/>
+              </a:rPr>
+              <a:t> </a:t>
+            </a:r>
+            <a:r>
+              <a:rPr lang="en-US" sz="2000" i="1" dirty="0" err="1" smtClean="0">
                 <a:latin typeface="Open Sans" panose="020B0606030504020204" pitchFamily="34" charset="0"/>
                 <a:ea typeface="Open Sans" panose="020B0606030504020204" pitchFamily="34" charset="0"/>
                 <a:cs typeface="Open Sans" panose="020B0606030504020204" pitchFamily="34" charset="0"/>
@@ -24814,8 +24910,13 @@
                 <a:ea typeface="Open Sans" panose="020B0606030504020204" pitchFamily="34" charset="0"/>
                 <a:cs typeface="Open Sans" panose="020B0606030504020204" pitchFamily="34" charset="0"/>
               </a:rPr>
-              <a:t> is</a:t>
-            </a:r>
+              <a:t>  is</a:t>
+            </a:r>
+            <a:endParaRPr lang="en-US" sz="2000" dirty="0" smtClean="0">
+              <a:latin typeface="Open Sans" panose="020B0606030504020204" pitchFamily="34" charset="0"/>
+              <a:ea typeface="Open Sans" panose="020B0606030504020204" pitchFamily="34" charset="0"/>
+              <a:cs typeface="Open Sans" panose="020B0606030504020204" pitchFamily="34" charset="0"/>
+            </a:endParaRPr>
           </a:p>
           <a:p>
             <a:pPr lvl="1"/>
@@ -24988,18 +25089,7 @@
                 <a:ea typeface="Open Sans" panose="020B0606030504020204" pitchFamily="34" charset="0"/>
                 <a:cs typeface="Open Sans" panose="020B0606030504020204" pitchFamily="34" charset="0"/>
               </a:rPr>
-              <a:t>1. L</a:t>
-            </a:r>
-            <a:r>
-              <a:rPr lang="en-US" altLang="en-US" sz="1200" b="1" dirty="0" smtClean="0">
-                <a:solidFill>
-                  <a:srgbClr val="3333CC"/>
-                </a:solidFill>
-                <a:latin typeface="Open Sans" panose="020B0606030504020204" pitchFamily="34" charset="0"/>
-                <a:ea typeface="Open Sans" panose="020B0606030504020204" pitchFamily="34" charset="0"/>
-                <a:cs typeface="Open Sans" panose="020B0606030504020204" pitchFamily="34" charset="0"/>
-              </a:rPr>
-              <a:t>. </a:t>
+              <a:t>1. L. </a:t>
             </a:r>
             <a:r>
               <a:rPr lang="en-US" altLang="en-US" sz="1200" b="1" dirty="0" err="1" smtClean="0">
@@ -25032,18 +25122,7 @@
                 <a:ea typeface="Open Sans" panose="020B0606030504020204" pitchFamily="34" charset="0"/>
                 <a:cs typeface="Open Sans" panose="020B0606030504020204" pitchFamily="34" charset="0"/>
               </a:rPr>
-              <a:t>1993</a:t>
-            </a:r>
-            <a:r>
-              <a:rPr lang="en-US" altLang="en-US" sz="1200" b="1" i="1" dirty="0" smtClean="0">
-                <a:solidFill>
-                  <a:srgbClr val="3333CC"/>
-                </a:solidFill>
-                <a:latin typeface="Open Sans" panose="020B0606030504020204" pitchFamily="34" charset="0"/>
-                <a:ea typeface="Open Sans" panose="020B0606030504020204" pitchFamily="34" charset="0"/>
-                <a:cs typeface="Open Sans" panose="020B0606030504020204" pitchFamily="34" charset="0"/>
-              </a:rPr>
-              <a:t>.</a:t>
+              <a:t>1993.</a:t>
             </a:r>
           </a:p>
           <a:p>
@@ -25194,7 +25273,7 @@
         </p:blipFill>
         <p:spPr>
           <a:xfrm>
-            <a:off x="2286000" y="4133114"/>
+            <a:off x="2418638" y="4133114"/>
             <a:ext cx="400762" cy="210286"/>
           </a:xfrm>
           <a:prstGeom prst="rect">
@@ -26095,7 +26174,7 @@
               <a:t>starting at </a:t>
             </a:r>
             <a:r>
-              <a:rPr lang="en-US" sz="2000" dirty="0" err="1" smtClean="0">
+              <a:rPr lang="en-US" sz="2000" i="1" dirty="0" err="1" smtClean="0">
                 <a:latin typeface="Open Sans" panose="020B0606030504020204" pitchFamily="34" charset="0"/>
                 <a:ea typeface="Open Sans" panose="020B0606030504020204" pitchFamily="34" charset="0"/>
                 <a:cs typeface="Open Sans" panose="020B0606030504020204" pitchFamily="34" charset="0"/>
@@ -26130,12 +26209,52 @@
           <a:p>
             <a:pPr lvl="2"/>
             <a:r>
+              <a:rPr lang="en-US" sz="1800" i="1" dirty="0" smtClean="0">
+                <a:latin typeface="Open Sans" panose="020B0606030504020204" pitchFamily="34" charset="0"/>
+                <a:ea typeface="Open Sans" panose="020B0606030504020204" pitchFamily="34" charset="0"/>
+                <a:cs typeface="Open Sans" panose="020B0606030504020204" pitchFamily="34" charset="0"/>
+              </a:rPr>
+              <a:t>X</a:t>
+            </a:r>
+            <a:r>
               <a:rPr lang="en-US" sz="1800" dirty="0" smtClean="0">
                 <a:latin typeface="Open Sans" panose="020B0606030504020204" pitchFamily="34" charset="0"/>
                 <a:ea typeface="Open Sans" panose="020B0606030504020204" pitchFamily="34" charset="0"/>
                 <a:cs typeface="Open Sans" panose="020B0606030504020204" pitchFamily="34" charset="0"/>
               </a:rPr>
-              <a:t>X = the first time w returns to </a:t>
+              <a:t> = the first time w returns to </a:t>
+            </a:r>
+            <a:r>
+              <a:rPr lang="en-US" sz="1800" i="1" dirty="0" err="1" smtClean="0">
+                <a:latin typeface="Open Sans" panose="020B0606030504020204" pitchFamily="34" charset="0"/>
+                <a:ea typeface="Open Sans" panose="020B0606030504020204" pitchFamily="34" charset="0"/>
+                <a:cs typeface="Open Sans" panose="020B0606030504020204" pitchFamily="34" charset="0"/>
+              </a:rPr>
+              <a:t>i</a:t>
+            </a:r>
+            <a:endParaRPr lang="en-US" sz="1800" i="1" dirty="0" smtClean="0">
+              <a:latin typeface="Open Sans" panose="020B0606030504020204" pitchFamily="34" charset="0"/>
+              <a:ea typeface="Open Sans" panose="020B0606030504020204" pitchFamily="34" charset="0"/>
+              <a:cs typeface="Open Sans" panose="020B0606030504020204" pitchFamily="34" charset="0"/>
+            </a:endParaRPr>
+          </a:p>
+          <a:p>
+            <a:pPr lvl="2"/>
+            <a:r>
+              <a:rPr lang="en-US" sz="1800" i="1" dirty="0" smtClean="0">
+                <a:latin typeface="Open Sans" panose="020B0606030504020204" pitchFamily="34" charset="0"/>
+                <a:ea typeface="Open Sans" panose="020B0606030504020204" pitchFamily="34" charset="0"/>
+                <a:cs typeface="Open Sans" panose="020B0606030504020204" pitchFamily="34" charset="0"/>
+              </a:rPr>
+              <a:t>Y</a:t>
+            </a:r>
+            <a:r>
+              <a:rPr lang="en-US" sz="1800" dirty="0" smtClean="0">
+                <a:latin typeface="Open Sans" panose="020B0606030504020204" pitchFamily="34" charset="0"/>
+                <a:ea typeface="Open Sans" panose="020B0606030504020204" pitchFamily="34" charset="0"/>
+                <a:cs typeface="Open Sans" panose="020B0606030504020204" pitchFamily="34" charset="0"/>
+              </a:rPr>
+              <a:t> = the first time w returns to </a:t>
             </a:r>
             <a:r>
               <a:rPr lang="en-US" sz="1800" dirty="0" err="1" smtClean="0">
@@ -26145,38 +26264,27 @@
               </a:rPr>
               <a:t>i</a:t>
             </a:r>
-            <a:endParaRPr lang="en-US" sz="1800" dirty="0" smtClean="0">
-              <a:latin typeface="Open Sans" panose="020B0606030504020204" pitchFamily="34" charset="0"/>
-              <a:ea typeface="Open Sans" panose="020B0606030504020204" pitchFamily="34" charset="0"/>
-              <a:cs typeface="Open Sans" panose="020B0606030504020204" pitchFamily="34" charset="0"/>
-            </a:endParaRPr>
-          </a:p>
-          <a:p>
-            <a:pPr lvl="2"/>
             <a:r>
               <a:rPr lang="en-US" sz="1800" dirty="0" smtClean="0">
                 <a:latin typeface="Open Sans" panose="020B0606030504020204" pitchFamily="34" charset="0"/>
                 <a:ea typeface="Open Sans" panose="020B0606030504020204" pitchFamily="34" charset="0"/>
                 <a:cs typeface="Open Sans" panose="020B0606030504020204" pitchFamily="34" charset="0"/>
               </a:rPr>
-              <a:t>Y = the first time w returns to </a:t>
-            </a:r>
-            <a:r>
-              <a:rPr lang="en-US" sz="1800" dirty="0" err="1" smtClean="0">
+              <a:t> after visiting </a:t>
+            </a:r>
+            <a:r>
+              <a:rPr lang="en-US" sz="1800" i="1" dirty="0" smtClean="0">
                 <a:latin typeface="Open Sans" panose="020B0606030504020204" pitchFamily="34" charset="0"/>
                 <a:ea typeface="Open Sans" panose="020B0606030504020204" pitchFamily="34" charset="0"/>
                 <a:cs typeface="Open Sans" panose="020B0606030504020204" pitchFamily="34" charset="0"/>
               </a:rPr>
-              <a:t>i</a:t>
-            </a:r>
-            <a:r>
-              <a:rPr lang="en-US" sz="1800" dirty="0" smtClean="0">
-                <a:latin typeface="Open Sans" panose="020B0606030504020204" pitchFamily="34" charset="0"/>
-                <a:ea typeface="Open Sans" panose="020B0606030504020204" pitchFamily="34" charset="0"/>
-                <a:cs typeface="Open Sans" panose="020B0606030504020204" pitchFamily="34" charset="0"/>
-              </a:rPr>
-              <a:t> after visiting j </a:t>
-            </a:r>
+              <a:t>j</a:t>
+            </a:r>
+            <a:endParaRPr lang="en-US" sz="1800" i="1" dirty="0" smtClean="0">
+              <a:latin typeface="Open Sans" panose="020B0606030504020204" pitchFamily="34" charset="0"/>
+              <a:ea typeface="Open Sans" panose="020B0606030504020204" pitchFamily="34" charset="0"/>
+              <a:cs typeface="Open Sans" panose="020B0606030504020204" pitchFamily="34" charset="0"/>
+            </a:endParaRPr>
           </a:p>
           <a:p>
             <a:pPr lvl="1"/>
@@ -26197,7 +26305,23 @@
                 <a:ea typeface="Open Sans" panose="020B0606030504020204" pitchFamily="34" charset="0"/>
                 <a:cs typeface="Open Sans" panose="020B0606030504020204" pitchFamily="34" charset="0"/>
               </a:rPr>
-              <a:t>Cleary X ≤ Y, and</a:t>
+              <a:t>Cleary </a:t>
+            </a:r>
+            <a:r>
+              <a:rPr lang="en-US" sz="2000" i="1" dirty="0" smtClean="0">
+                <a:latin typeface="Open Sans" panose="020B0606030504020204" pitchFamily="34" charset="0"/>
+                <a:ea typeface="Open Sans" panose="020B0606030504020204" pitchFamily="34" charset="0"/>
+                <a:cs typeface="Open Sans" panose="020B0606030504020204" pitchFamily="34" charset="0"/>
+              </a:rPr>
+              <a:t>X ≤ Y</a:t>
+            </a:r>
+            <a:r>
+              <a:rPr lang="en-US" sz="2000" dirty="0" smtClean="0">
+                <a:latin typeface="Open Sans" panose="020B0606030504020204" pitchFamily="34" charset="0"/>
+                <a:ea typeface="Open Sans" panose="020B0606030504020204" pitchFamily="34" charset="0"/>
+                <a:cs typeface="Open Sans" panose="020B0606030504020204" pitchFamily="34" charset="0"/>
+              </a:rPr>
+              <a:t>, and</a:t>
             </a:r>
           </a:p>
           <a:p>
@@ -27518,18 +27642,7 @@
                 <a:ea typeface="Open Sans" panose="020B0606030504020204" pitchFamily="34" charset="0"/>
                 <a:cs typeface="Open Sans" panose="020B0606030504020204" pitchFamily="34" charset="0"/>
               </a:rPr>
-              <a:t>1. </a:t>
-            </a:r>
-            <a:r>
-              <a:rPr lang="en-US" altLang="en-US" sz="1200" b="1" dirty="0">
-                <a:solidFill>
-                  <a:srgbClr val="3333CC"/>
-                </a:solidFill>
-                <a:latin typeface="Open Sans" panose="020B0606030504020204" pitchFamily="34" charset="0"/>
-                <a:ea typeface="Open Sans" panose="020B0606030504020204" pitchFamily="34" charset="0"/>
-                <a:cs typeface="Open Sans" panose="020B0606030504020204" pitchFamily="34" charset="0"/>
-              </a:rPr>
-              <a:t>P. Sarkar, A. Moore, &amp; A. Prakash. Fast Incremental Proximity Search in Large Graphs. </a:t>
+              <a:t>1. P. Sarkar, A. Moore, &amp; A. Prakash. Fast Incremental Proximity Search in Large Graphs. </a:t>
             </a:r>
             <a:r>
               <a:rPr lang="en-US" altLang="en-US" sz="1200" b="1" i="1" dirty="0">
@@ -27573,18 +27686,7 @@
                 <a:ea typeface="Open Sans" panose="020B0606030504020204" pitchFamily="34" charset="0"/>
                 <a:cs typeface="Open Sans" panose="020B0606030504020204" pitchFamily="34" charset="0"/>
               </a:rPr>
-              <a:t>. </a:t>
-            </a:r>
-            <a:r>
-              <a:rPr lang="en-US" altLang="en-US" sz="1200" b="1" dirty="0">
-                <a:solidFill>
-                  <a:srgbClr val="3333CC"/>
-                </a:solidFill>
-                <a:latin typeface="Open Sans" panose="020B0606030504020204" pitchFamily="34" charset="0"/>
-                <a:ea typeface="Open Sans" panose="020B0606030504020204" pitchFamily="34" charset="0"/>
-                <a:cs typeface="Open Sans" panose="020B0606030504020204" pitchFamily="34" charset="0"/>
-              </a:rPr>
-              <a:t>H. Tong, Y. </a:t>
+              <a:t>. H. Tong, Y. </a:t>
             </a:r>
             <a:r>
               <a:rPr lang="en-US" altLang="en-US" sz="1200" b="1" dirty="0" err="1">
@@ -30520,15 +30622,23 @@
                 <a:ea typeface="Open Sans" panose="020B0606030504020204" pitchFamily="34" charset="0"/>
                 <a:cs typeface="Open Sans" panose="020B0606030504020204" pitchFamily="34" charset="0"/>
               </a:rPr>
-              <a:t>e.g.                when computing proximity from node </a:t>
-            </a:r>
-            <a:r>
-              <a:rPr lang="en-US" altLang="en-US" sz="2000" dirty="0" err="1" smtClean="0">
+              <a:t>e.g.                when computing </a:t>
+            </a:r>
+            <a:r>
+              <a:rPr lang="en-US" altLang="en-US" sz="2000" dirty="0" smtClean="0">
                 <a:latin typeface="Open Sans" panose="020B0606030504020204" pitchFamily="34" charset="0"/>
                 <a:ea typeface="Open Sans" panose="020B0606030504020204" pitchFamily="34" charset="0"/>
                 <a:cs typeface="Open Sans" panose="020B0606030504020204" pitchFamily="34" charset="0"/>
               </a:rPr>
-              <a:t>i</a:t>
+              <a:t>proximities </a:t>
+            </a:r>
+            <a:r>
+              <a:rPr lang="en-US" altLang="en-US" sz="2000" dirty="0" smtClean="0">
+                <a:latin typeface="Open Sans" panose="020B0606030504020204" pitchFamily="34" charset="0"/>
+                <a:ea typeface="Open Sans" panose="020B0606030504020204" pitchFamily="34" charset="0"/>
+                <a:cs typeface="Open Sans" panose="020B0606030504020204" pitchFamily="34" charset="0"/>
+              </a:rPr>
+              <a:t>from node </a:t>
             </a:r>
             <a:r>
               <a:rPr lang="en-US" altLang="en-US" sz="2000" dirty="0" smtClean="0">
@@ -30538,6 +30648,27 @@
               </a:rPr>
               <a:t> </a:t>
             </a:r>
+            <a:r>
+              <a:rPr lang="en-US" altLang="en-US" sz="2000" i="1" dirty="0" err="1" smtClean="0">
+                <a:latin typeface="Open Sans" panose="020B0606030504020204" pitchFamily="34" charset="0"/>
+                <a:ea typeface="Open Sans" panose="020B0606030504020204" pitchFamily="34" charset="0"/>
+                <a:cs typeface="Open Sans" panose="020B0606030504020204" pitchFamily="34" charset="0"/>
+              </a:rPr>
+              <a:t>i</a:t>
+            </a:r>
+            <a:r>
+              <a:rPr lang="en-US" altLang="en-US" sz="2000" dirty="0" smtClean="0">
+                <a:latin typeface="Open Sans" panose="020B0606030504020204" pitchFamily="34" charset="0"/>
+                <a:ea typeface="Open Sans" panose="020B0606030504020204" pitchFamily="34" charset="0"/>
+                <a:cs typeface="Open Sans" panose="020B0606030504020204" pitchFamily="34" charset="0"/>
+              </a:rPr>
+              <a:t> </a:t>
+            </a:r>
+            <a:endParaRPr lang="en-US" altLang="en-US" sz="2000" dirty="0" smtClean="0">
+              <a:latin typeface="Open Sans" panose="020B0606030504020204" pitchFamily="34" charset="0"/>
+              <a:ea typeface="Open Sans" panose="020B0606030504020204" pitchFamily="34" charset="0"/>
+              <a:cs typeface="Open Sans" panose="020B0606030504020204" pitchFamily="34" charset="0"/>
+            </a:endParaRPr>
           </a:p>
           <a:p>
             <a:pPr lvl="1"/>
@@ -31476,18 +31607,7 @@
                 <a:ea typeface="Open Sans" panose="020B0606030504020204" pitchFamily="34" charset="0"/>
                 <a:cs typeface="Open Sans" panose="020B0606030504020204" pitchFamily="34" charset="0"/>
               </a:rPr>
-              <a:t>s small whenever  </a:t>
-            </a:r>
-            <a:r>
-              <a:rPr lang="en-US" altLang="en-US" sz="2000" dirty="0" smtClean="0">
-                <a:solidFill>
-                  <a:srgbClr val="FF0000"/>
-                </a:solidFill>
-                <a:latin typeface="Open Sans" panose="020B0606030504020204" pitchFamily="34" charset="0"/>
-                <a:ea typeface="Open Sans" panose="020B0606030504020204" pitchFamily="34" charset="0"/>
-                <a:cs typeface="Open Sans" panose="020B0606030504020204" pitchFamily="34" charset="0"/>
-              </a:rPr>
-              <a:t> </a:t>
+              <a:t>s small </a:t>
             </a:r>
             <a:r>
               <a:rPr lang="en-US" altLang="en-US" sz="2000" dirty="0" smtClean="0">
@@ -31495,7 +31615,42 @@
                 <a:ea typeface="Open Sans" panose="020B0606030504020204" pitchFamily="34" charset="0"/>
                 <a:cs typeface="Open Sans" panose="020B0606030504020204" pitchFamily="34" charset="0"/>
               </a:rPr>
-              <a:t>  has a large stationary probability </a:t>
+              <a:t>whenever  </a:t>
+            </a:r>
+            <a:r>
+              <a:rPr lang="en-US" altLang="en-US" sz="2000" i="1" dirty="0" smtClean="0">
+                <a:latin typeface="Open Sans" panose="020B0606030504020204" pitchFamily="34" charset="0"/>
+                <a:ea typeface="Open Sans" panose="020B0606030504020204" pitchFamily="34" charset="0"/>
+                <a:cs typeface="Open Sans" panose="020B0606030504020204" pitchFamily="34" charset="0"/>
+              </a:rPr>
+              <a:t>j</a:t>
+            </a:r>
+            <a:r>
+              <a:rPr lang="en-US" altLang="en-US" sz="2000" dirty="0" smtClean="0">
+                <a:solidFill>
+                  <a:srgbClr val="FF0000"/>
+                </a:solidFill>
+                <a:latin typeface="Open Sans" panose="020B0606030504020204" pitchFamily="34" charset="0"/>
+                <a:ea typeface="Open Sans" panose="020B0606030504020204" pitchFamily="34" charset="0"/>
+                <a:cs typeface="Open Sans" panose="020B0606030504020204" pitchFamily="34" charset="0"/>
+              </a:rPr>
+              <a:t>  </a:t>
+            </a:r>
+            <a:r>
+              <a:rPr lang="en-US" altLang="en-US" sz="2000" dirty="0" smtClean="0">
+                <a:latin typeface="Open Sans" panose="020B0606030504020204" pitchFamily="34" charset="0"/>
+                <a:ea typeface="Open Sans" panose="020B0606030504020204" pitchFamily="34" charset="0"/>
+                <a:cs typeface="Open Sans" panose="020B0606030504020204" pitchFamily="34" charset="0"/>
+              </a:rPr>
+              <a:t>has </a:t>
+            </a:r>
+            <a:r>
+              <a:rPr lang="en-US" altLang="en-US" sz="2000" dirty="0" smtClean="0">
+                <a:latin typeface="Open Sans" panose="020B0606030504020204" pitchFamily="34" charset="0"/>
+                <a:ea typeface="Open Sans" panose="020B0606030504020204" pitchFamily="34" charset="0"/>
+                <a:cs typeface="Open Sans" panose="020B0606030504020204" pitchFamily="34" charset="0"/>
+              </a:rPr>
+              <a:t>a large stationary probability </a:t>
             </a:r>
             <a:endParaRPr lang="en-US" altLang="en-US" sz="2000" dirty="0" smtClean="0">
               <a:solidFill>
@@ -31747,7 +31902,7 @@
           </p:nvPr>
         </p:nvPicPr>
         <p:blipFill>
-          <a:blip r:embed="rId11" cstate="print">
+          <a:blip r:embed="rId10" cstate="print">
             <a:extLst>
               <a:ext uri="{28A0092B-C50C-407E-A947-70E740481C1C}">
                 <a14:useLocalDpi xmlns:a14="http://schemas.microsoft.com/office/drawing/2010/main" val="0"/>
@@ -31781,7 +31936,7 @@
           </p:nvPr>
         </p:nvPicPr>
         <p:blipFill>
-          <a:blip r:embed="rId12" cstate="print">
+          <a:blip r:embed="rId11" cstate="print">
             <a:extLst>
               <a:ext uri="{28A0092B-C50C-407E-A947-70E740481C1C}">
                 <a14:useLocalDpi xmlns:a14="http://schemas.microsoft.com/office/drawing/2010/main" val="0"/>
@@ -31815,7 +31970,7 @@
           </p:nvPr>
         </p:nvPicPr>
         <p:blipFill>
-          <a:blip r:embed="rId13" cstate="print">
+          <a:blip r:embed="rId12" cstate="print">
             <a:extLst>
               <a:ext uri="{28A0092B-C50C-407E-A947-70E740481C1C}">
                 <a14:useLocalDpi xmlns:a14="http://schemas.microsoft.com/office/drawing/2010/main" val="0"/>
@@ -31849,7 +32004,7 @@
           </p:nvPr>
         </p:nvPicPr>
         <p:blipFill>
-          <a:blip r:embed="rId14" cstate="print">
+          <a:blip r:embed="rId13" cstate="print">
             <a:extLst>
               <a:ext uri="{28A0092B-C50C-407E-A947-70E740481C1C}">
                 <a14:useLocalDpi xmlns:a14="http://schemas.microsoft.com/office/drawing/2010/main" val="0"/>
@@ -31883,7 +32038,7 @@
           </p:nvPr>
         </p:nvPicPr>
         <p:blipFill>
-          <a:blip r:embed="rId15" cstate="print">
+          <a:blip r:embed="rId14" cstate="print">
             <a:extLst>
               <a:ext uri="{28A0092B-C50C-407E-A947-70E740481C1C}">
                 <a14:useLocalDpi xmlns:a14="http://schemas.microsoft.com/office/drawing/2010/main" val="0"/>
@@ -31906,7 +32061,7 @@
       </p:pic>
       <p:pic>
         <p:nvPicPr>
-          <p:cNvPr id="11" name="Picture 10"/>
+          <p:cNvPr id="14" name="Picture 13"/>
           <p:cNvPicPr>
             <a:picLocks noChangeAspect="1"/>
           </p:cNvPicPr>
@@ -31917,41 +32072,7 @@
           </p:nvPr>
         </p:nvPicPr>
         <p:blipFill>
-          <a:blip r:embed="rId16" cstate="print">
-            <a:extLst>
-              <a:ext uri="{28A0092B-C50C-407E-A947-70E740481C1C}">
-                <a14:useLocalDpi xmlns:a14="http://schemas.microsoft.com/office/drawing/2010/main" val="0"/>
-              </a:ext>
-            </a:extLst>
-          </a:blip>
-          <a:stretch>
-            <a:fillRect/>
-          </a:stretch>
-        </p:blipFill>
-        <p:spPr>
-          <a:xfrm>
-            <a:off x="4162057" y="4834124"/>
-            <a:ext cx="105143" cy="217905"/>
-          </a:xfrm>
-          <a:prstGeom prst="rect">
-            <a:avLst/>
-          </a:prstGeom>
-        </p:spPr>
-      </p:pic>
-      <p:pic>
-        <p:nvPicPr>
-          <p:cNvPr id="14" name="Picture 13"/>
-          <p:cNvPicPr>
-            <a:picLocks noChangeAspect="1"/>
-          </p:cNvPicPr>
-          <p:nvPr>
-            <p:custDataLst>
-              <p:tags r:id="rId8"/>
-            </p:custDataLst>
-          </p:nvPr>
-        </p:nvPicPr>
-        <p:blipFill>
-          <a:blip r:embed="rId17" cstate="print">
+          <a:blip r:embed="rId15" cstate="print">
             <a:extLst>
               <a:ext uri="{28A0092B-C50C-407E-A947-70E740481C1C}">
                 <a14:useLocalDpi xmlns:a14="http://schemas.microsoft.com/office/drawing/2010/main" val="0"/>
@@ -32349,9 +32470,25 @@
                 <a:ea typeface="Open Sans" panose="020B0606030504020204" pitchFamily="34" charset="0"/>
                 <a:cs typeface="Open Sans" panose="020B0606030504020204" pitchFamily="34" charset="0"/>
               </a:rPr>
-              <a:t>Only considers paths of length at most</a:t>
-            </a:r>
-            <a:endParaRPr lang="en-US" altLang="en-US" sz="2000" dirty="0" smtClean="0">
+              <a:t>Only considers paths of length at </a:t>
+            </a:r>
+            <a:r>
+              <a:rPr lang="en-US" altLang="en-US" sz="2000" dirty="0" smtClean="0">
+                <a:latin typeface="Open Sans" panose="020B0606030504020204" pitchFamily="34" charset="0"/>
+                <a:ea typeface="Open Sans" panose="020B0606030504020204" pitchFamily="34" charset="0"/>
+                <a:cs typeface="Open Sans" panose="020B0606030504020204" pitchFamily="34" charset="0"/>
+              </a:rPr>
+              <a:t>most </a:t>
+            </a:r>
+            <a:r>
+              <a:rPr lang="en-US" altLang="en-US" sz="2000" i="1" dirty="0" smtClean="0">
+                <a:latin typeface="Open Sans" panose="020B0606030504020204" pitchFamily="34" charset="0"/>
+                <a:ea typeface="Open Sans" panose="020B0606030504020204" pitchFamily="34" charset="0"/>
+                <a:cs typeface="Open Sans" panose="020B0606030504020204" pitchFamily="34" charset="0"/>
+              </a:rPr>
+              <a:t>T</a:t>
+            </a:r>
+            <a:endParaRPr lang="en-US" altLang="en-US" sz="2000" i="1" dirty="0" smtClean="0">
               <a:solidFill>
                 <a:srgbClr val="FF0000"/>
               </a:solidFill>
@@ -32385,7 +32522,7 @@
           <p:nvPr/>
         </p:nvPicPr>
         <p:blipFill>
-          <a:blip r:embed="rId5">
+          <a:blip r:embed="rId4">
             <a:extLst>
               <a:ext uri="{28A0092B-C50C-407E-A947-70E740481C1C}">
                 <a14:useLocalDpi xmlns:a14="http://schemas.microsoft.com/office/drawing/2010/main" val="0"/>
@@ -32450,7 +32587,7 @@
             <p:nvPr/>
           </p:nvPicPr>
           <p:blipFill>
-            <a:blip r:embed="rId6">
+            <a:blip r:embed="rId5">
               <a:extLst>
                 <a:ext uri="{28A0092B-C50C-407E-A947-70E740481C1C}">
                   <a14:useLocalDpi xmlns:a14="http://schemas.microsoft.com/office/drawing/2010/main" val="0"/>
@@ -33254,160 +33391,6 @@
       </p:sp>
       <p:sp>
         <p:nvSpPr>
-          <p:cNvPr id="10" name="AutoShape 12"/>
-          <p:cNvSpPr>
-            <a:spLocks noChangeArrowheads="1"/>
-          </p:cNvSpPr>
-          <p:nvPr/>
-        </p:nvSpPr>
-        <p:spPr bwMode="auto">
-          <a:xfrm>
-            <a:off x="1106488" y="2286000"/>
-            <a:ext cx="2724150" cy="1027113"/>
-          </a:xfrm>
-          <a:prstGeom prst="cloudCallout">
-            <a:avLst>
-              <a:gd name="adj1" fmla="val -47903"/>
-              <a:gd name="adj2" fmla="val 61903"/>
-            </a:avLst>
-          </a:prstGeom>
-          <a:solidFill>
-            <a:schemeClr val="folHlink"/>
-          </a:solidFill>
-          <a:ln w="9525">
-            <a:solidFill>
-              <a:schemeClr val="tx1"/>
-            </a:solidFill>
-            <a:round/>
-            <a:headEnd/>
-            <a:tailEnd/>
-          </a:ln>
-          <a:effectLst/>
-          <a:extLst>
-            <a:ext uri="{AF507438-7753-43E0-B8FC-AC1667EBCBE1}">
-              <a14:hiddenEffects xmlns:a14="http://schemas.microsoft.com/office/drawing/2010/main">
-                <a:effectLst>
-                  <a:outerShdw blurRad="63500" dist="38099" dir="2700000" algn="ctr" rotWithShape="0">
-                    <a:schemeClr val="bg2">
-                      <a:alpha val="74998"/>
-                    </a:schemeClr>
-                  </a:outerShdw>
-                </a:effectLst>
-              </a14:hiddenEffects>
-            </a:ext>
-          </a:extLst>
-        </p:spPr>
-        <p:txBody>
-          <a:bodyPr/>
-          <a:lstStyle>
-            <a:lvl1pPr eaLnBrk="0" hangingPunct="0">
-              <a:defRPr>
-                <a:solidFill>
-                  <a:schemeClr val="tx1"/>
-                </a:solidFill>
-                <a:latin typeface="Arial" charset="0"/>
-              </a:defRPr>
-            </a:lvl1pPr>
-            <a:lvl2pPr marL="742950" indent="-285750" eaLnBrk="0" hangingPunct="0">
-              <a:defRPr>
-                <a:solidFill>
-                  <a:schemeClr val="tx1"/>
-                </a:solidFill>
-                <a:latin typeface="Arial" charset="0"/>
-              </a:defRPr>
-            </a:lvl2pPr>
-            <a:lvl3pPr marL="1143000" indent="-228600" eaLnBrk="0" hangingPunct="0">
-              <a:defRPr>
-                <a:solidFill>
-                  <a:schemeClr val="tx1"/>
-                </a:solidFill>
-                <a:latin typeface="Arial" charset="0"/>
-              </a:defRPr>
-            </a:lvl3pPr>
-            <a:lvl4pPr marL="1600200" indent="-228600" eaLnBrk="0" hangingPunct="0">
-              <a:defRPr>
-                <a:solidFill>
-                  <a:schemeClr val="tx1"/>
-                </a:solidFill>
-                <a:latin typeface="Arial" charset="0"/>
-              </a:defRPr>
-            </a:lvl4pPr>
-            <a:lvl5pPr marL="2057400" indent="-228600" eaLnBrk="0" hangingPunct="0">
-              <a:defRPr>
-                <a:solidFill>
-                  <a:schemeClr val="tx1"/>
-                </a:solidFill>
-                <a:latin typeface="Arial" charset="0"/>
-              </a:defRPr>
-            </a:lvl5pPr>
-            <a:lvl6pPr marL="2514600" indent="-228600" eaLnBrk="0" fontAlgn="base" hangingPunct="0">
-              <a:spcBef>
-                <a:spcPct val="0"/>
-              </a:spcBef>
-              <a:spcAft>
-                <a:spcPct val="0"/>
-              </a:spcAft>
-              <a:defRPr>
-                <a:solidFill>
-                  <a:schemeClr val="tx1"/>
-                </a:solidFill>
-                <a:latin typeface="Arial" charset="0"/>
-              </a:defRPr>
-            </a:lvl6pPr>
-            <a:lvl7pPr marL="2971800" indent="-228600" eaLnBrk="0" fontAlgn="base" hangingPunct="0">
-              <a:spcBef>
-                <a:spcPct val="0"/>
-              </a:spcBef>
-              <a:spcAft>
-                <a:spcPct val="0"/>
-              </a:spcAft>
-              <a:defRPr>
-                <a:solidFill>
-                  <a:schemeClr val="tx1"/>
-                </a:solidFill>
-                <a:latin typeface="Arial" charset="0"/>
-              </a:defRPr>
-            </a:lvl7pPr>
-            <a:lvl8pPr marL="3429000" indent="-228600" eaLnBrk="0" fontAlgn="base" hangingPunct="0">
-              <a:spcBef>
-                <a:spcPct val="0"/>
-              </a:spcBef>
-              <a:spcAft>
-                <a:spcPct val="0"/>
-              </a:spcAft>
-              <a:defRPr>
-                <a:solidFill>
-                  <a:schemeClr val="tx1"/>
-                </a:solidFill>
-                <a:latin typeface="Arial" charset="0"/>
-              </a:defRPr>
-            </a:lvl8pPr>
-            <a:lvl9pPr marL="3886200" indent="-228600" eaLnBrk="0" fontAlgn="base" hangingPunct="0">
-              <a:spcBef>
-                <a:spcPct val="0"/>
-              </a:spcBef>
-              <a:spcAft>
-                <a:spcPct val="0"/>
-              </a:spcAft>
-              <a:defRPr>
-                <a:solidFill>
-                  <a:schemeClr val="tx1"/>
-                </a:solidFill>
-                <a:latin typeface="Arial" charset="0"/>
-              </a:defRPr>
-            </a:lvl9pPr>
-          </a:lstStyle>
-          <a:p>
-            <a:pPr algn="ctr" eaLnBrk="1" hangingPunct="1"/>
-            <a:r>
-              <a:rPr lang="en-US" altLang="en-US" sz="1600"/>
-              <a:t>Random walk gets lost here.</a:t>
-            </a:r>
-          </a:p>
-        </p:txBody>
-      </p:sp>
-      <p:sp>
-        <p:nvSpPr>
           <p:cNvPr id="11" name="Rectangle 6"/>
           <p:cNvSpPr>
             <a:spLocks noChangeArrowheads="1"/>
@@ -33528,40 +33511,6 @@
           </a:p>
         </p:txBody>
       </p:sp>
-      <p:pic>
-        <p:nvPicPr>
-          <p:cNvPr id="2" name="Picture 1"/>
-          <p:cNvPicPr>
-            <a:picLocks noChangeAspect="1"/>
-          </p:cNvPicPr>
-          <p:nvPr>
-            <p:custDataLst>
-              <p:tags r:id="rId2"/>
-            </p:custDataLst>
-          </p:nvPr>
-        </p:nvPicPr>
-        <p:blipFill>
-          <a:blip r:embed="rId7" cstate="print">
-            <a:extLst>
-              <a:ext uri="{28A0092B-C50C-407E-A947-70E740481C1C}">
-                <a14:useLocalDpi xmlns:a14="http://schemas.microsoft.com/office/drawing/2010/main" val="0"/>
-              </a:ext>
-            </a:extLst>
-          </a:blip>
-          <a:stretch>
-            <a:fillRect/>
-          </a:stretch>
-        </p:blipFill>
-        <p:spPr>
-          <a:xfrm>
-            <a:off x="5867400" y="1752600"/>
-            <a:ext cx="173714" cy="170667"/>
-          </a:xfrm>
-          <a:prstGeom prst="rect">
-            <a:avLst/>
-          </a:prstGeom>
-        </p:spPr>
-      </p:pic>
     </p:spTree>
     <p:custDataLst>
       <p:tags r:id="rId1"/>
@@ -33671,7 +33620,23 @@
                 <a:ea typeface="Open Sans" panose="020B0606030504020204" pitchFamily="34" charset="0"/>
                 <a:cs typeface="Open Sans" panose="020B0606030504020204" pitchFamily="34" charset="0"/>
               </a:rPr>
-              <a:t>The escape probability from node A </a:t>
+              <a:t>The escape probability from node </a:t>
+            </a:r>
+            <a:r>
+              <a:rPr lang="en-US" altLang="en-US" sz="2400" i="1" dirty="0" smtClean="0">
+                <a:latin typeface="Open Sans" panose="020B0606030504020204" pitchFamily="34" charset="0"/>
+                <a:ea typeface="Open Sans" panose="020B0606030504020204" pitchFamily="34" charset="0"/>
+                <a:cs typeface="Open Sans" panose="020B0606030504020204" pitchFamily="34" charset="0"/>
+              </a:rPr>
+              <a:t>A</a:t>
+            </a:r>
+            <a:r>
+              <a:rPr lang="en-US" altLang="en-US" sz="2400" dirty="0" smtClean="0">
+                <a:latin typeface="Open Sans" panose="020B0606030504020204" pitchFamily="34" charset="0"/>
+                <a:ea typeface="Open Sans" panose="020B0606030504020204" pitchFamily="34" charset="0"/>
+                <a:cs typeface="Open Sans" panose="020B0606030504020204" pitchFamily="34" charset="0"/>
+              </a:rPr>
+              <a:t> </a:t>
             </a:r>
             <a:r>
               <a:rPr lang="en-US" altLang="zh-CN" sz="2400" dirty="0" smtClean="0">
@@ -33679,7 +33644,15 @@
                 <a:ea typeface="Open Sans" panose="020B0606030504020204" pitchFamily="34" charset="0"/>
                 <a:cs typeface="Open Sans" panose="020B0606030504020204" pitchFamily="34" charset="0"/>
               </a:rPr>
-              <a:t>to node</a:t>
+              <a:t>to </a:t>
+            </a:r>
+            <a:r>
+              <a:rPr lang="en-US" altLang="zh-CN" sz="2400" dirty="0" smtClean="0">
+                <a:latin typeface="Open Sans" panose="020B0606030504020204" pitchFamily="34" charset="0"/>
+                <a:ea typeface="Open Sans" panose="020B0606030504020204" pitchFamily="34" charset="0"/>
+                <a:cs typeface="Open Sans" panose="020B0606030504020204" pitchFamily="34" charset="0"/>
+              </a:rPr>
+              <a:t>node</a:t>
             </a:r>
             <a:r>
               <a:rPr lang="en-US" altLang="zh-CN" sz="2400" b="1" dirty="0">
@@ -33690,14 +33663,14 @@
               <a:t> </a:t>
             </a:r>
             <a:r>
-              <a:rPr lang="en-US" altLang="zh-CN" sz="2400" dirty="0" smtClean="0">
+              <a:rPr lang="en-US" altLang="zh-CN" sz="2400" i="1" dirty="0" smtClean="0">
                 <a:latin typeface="Open Sans" panose="020B0606030504020204" pitchFamily="34" charset="0"/>
                 <a:ea typeface="Open Sans" panose="020B0606030504020204" pitchFamily="34" charset="0"/>
                 <a:cs typeface="Open Sans" panose="020B0606030504020204" pitchFamily="34" charset="0"/>
               </a:rPr>
               <a:t>B</a:t>
             </a:r>
-            <a:endParaRPr lang="en-US" altLang="en-US" sz="2400" dirty="0">
+            <a:endParaRPr lang="en-US" altLang="en-US" sz="2400" i="1" dirty="0">
               <a:latin typeface="Open Sans" panose="020B0606030504020204" pitchFamily="34" charset="0"/>
               <a:ea typeface="Open Sans" panose="020B0606030504020204" pitchFamily="34" charset="0"/>
               <a:cs typeface="Open Sans" panose="020B0606030504020204" pitchFamily="34" charset="0"/>
@@ -33735,7 +33708,7 @@
                 <a:ea typeface="Open Sans" panose="020B0606030504020204" pitchFamily="34" charset="0"/>
                 <a:cs typeface="Open Sans" panose="020B0606030504020204" pitchFamily="34" charset="0"/>
               </a:rPr>
-              <a:t>[start</a:t>
+              <a:t>[ start</a:t>
             </a:r>
             <a:r>
               <a:rPr lang="en-US" altLang="zh-CN" sz="2000" dirty="0" smtClean="0">
@@ -33759,7 +33732,47 @@
                 <a:ea typeface="Open Sans" panose="020B0606030504020204" pitchFamily="34" charset="0"/>
                 <a:cs typeface="Open Sans" panose="020B0606030504020204" pitchFamily="34" charset="0"/>
               </a:rPr>
-              <a:t>at A, reaches B before return</a:t>
+              <a:t>at </a:t>
+            </a:r>
+            <a:r>
+              <a:rPr lang="en-US" altLang="en-US" sz="2000" i="1" dirty="0" smtClean="0">
+                <a:latin typeface="Open Sans" panose="020B0606030504020204" pitchFamily="34" charset="0"/>
+                <a:ea typeface="Open Sans" panose="020B0606030504020204" pitchFamily="34" charset="0"/>
+                <a:cs typeface="Open Sans" panose="020B0606030504020204" pitchFamily="34" charset="0"/>
+              </a:rPr>
+              <a:t>A</a:t>
+            </a:r>
+            <a:r>
+              <a:rPr lang="en-US" altLang="en-US" sz="2000" dirty="0" smtClean="0">
+                <a:latin typeface="Open Sans" panose="020B0606030504020204" pitchFamily="34" charset="0"/>
+                <a:ea typeface="Open Sans" panose="020B0606030504020204" pitchFamily="34" charset="0"/>
+                <a:cs typeface="Open Sans" panose="020B0606030504020204" pitchFamily="34" charset="0"/>
+              </a:rPr>
+              <a:t>, reaches </a:t>
+            </a:r>
+            <a:r>
+              <a:rPr lang="en-US" altLang="en-US" sz="2000" i="1" dirty="0" smtClean="0">
+                <a:latin typeface="Open Sans" panose="020B0606030504020204" pitchFamily="34" charset="0"/>
+                <a:ea typeface="Open Sans" panose="020B0606030504020204" pitchFamily="34" charset="0"/>
+                <a:cs typeface="Open Sans" panose="020B0606030504020204" pitchFamily="34" charset="0"/>
+              </a:rPr>
+              <a:t>B</a:t>
+            </a:r>
+            <a:r>
+              <a:rPr lang="en-US" altLang="en-US" sz="2000" dirty="0" smtClean="0">
+                <a:latin typeface="Open Sans" panose="020B0606030504020204" pitchFamily="34" charset="0"/>
+                <a:ea typeface="Open Sans" panose="020B0606030504020204" pitchFamily="34" charset="0"/>
+                <a:cs typeface="Open Sans" panose="020B0606030504020204" pitchFamily="34" charset="0"/>
+              </a:rPr>
+              <a:t> before </a:t>
+            </a:r>
+            <a:r>
+              <a:rPr lang="en-US" altLang="en-US" sz="2000" dirty="0" smtClean="0">
+                <a:latin typeface="Open Sans" panose="020B0606030504020204" pitchFamily="34" charset="0"/>
+                <a:ea typeface="Open Sans" panose="020B0606030504020204" pitchFamily="34" charset="0"/>
+                <a:cs typeface="Open Sans" panose="020B0606030504020204" pitchFamily="34" charset="0"/>
+              </a:rPr>
+              <a:t>return</a:t>
             </a:r>
             <a:r>
               <a:rPr lang="en-US" altLang="zh-CN" sz="2000" dirty="0" smtClean="0">
@@ -33778,12 +33791,20 @@
               <a:t> </a:t>
             </a:r>
             <a:r>
+              <a:rPr lang="en-US" altLang="zh-CN" sz="2000" i="1" dirty="0" smtClean="0">
+                <a:latin typeface="Open Sans" panose="020B0606030504020204" pitchFamily="34" charset="0"/>
+                <a:ea typeface="Open Sans" panose="020B0606030504020204" pitchFamily="34" charset="0"/>
+                <a:cs typeface="Open Sans" panose="020B0606030504020204" pitchFamily="34" charset="0"/>
+              </a:rPr>
+              <a:t>A</a:t>
+            </a:r>
+            <a:r>
               <a:rPr lang="en-US" altLang="zh-CN" sz="2000" dirty="0" smtClean="0">
                 <a:latin typeface="Open Sans" panose="020B0606030504020204" pitchFamily="34" charset="0"/>
                 <a:ea typeface="Open Sans" panose="020B0606030504020204" pitchFamily="34" charset="0"/>
                 <a:cs typeface="Open Sans" panose="020B0606030504020204" pitchFamily="34" charset="0"/>
               </a:rPr>
-              <a:t>A</a:t>
+              <a:t> </a:t>
             </a:r>
             <a:r>
               <a:rPr lang="en-US" altLang="en-US" sz="2000" dirty="0" smtClean="0">
@@ -35240,7 +35261,7 @@
           <a:graphicData uri="http://schemas.openxmlformats.org/presentationml/2006/ole">
             <mc:AlternateContent xmlns:mc="http://schemas.openxmlformats.org/markup-compatibility/2006">
               <mc:Choice xmlns:v="urn:schemas-microsoft-com:vml" Requires="v">
-                <p:oleObj spid="_x0000_s8984" name="Visio" r:id="rId6" imgW="5289194" imgH="2914802" progId="Visio.Drawing.11">
+                <p:oleObj spid="_x0000_s9060" name="Visio" r:id="rId6" imgW="5289194" imgH="2914802" progId="Visio.Drawing.11">
                   <p:embed/>
                 </p:oleObj>
               </mc:Choice>
@@ -35481,25 +35502,6 @@
 <file path=ppt/tags/tag15.xml><?xml version="1.0" encoding="utf-8"?>
 <p:tagLst xmlns:a="http://schemas.openxmlformats.org/drawingml/2006/main" xmlns:r="http://schemas.openxmlformats.org/officeDocument/2006/relationships" xmlns:p="http://schemas.openxmlformats.org/presentationml/2006/main">
   <p:tag name="OUTPUTDPI" val="1200"/>
-  <p:tag name="ORIGINALHEIGHT" val="107.2366"/>
-  <p:tag name="ORIGINALWIDTH" val="51.74354"/>
-  <p:tag name="LATEXADDIN" val="\documentclass{article}&#10;\usepackage{amsmath}&#10;\pagestyle{empty}&#10;\begin{document}&#10;&#10;$j$&#10;&#10;&#10;\end{document}"/>
-  <p:tag name="IGUANATEXSIZE" val="20"/>
-  <p:tag name="IGUANATEXCURSOR" val="84"/>
-  <p:tag name="TRANSPARENCY" val="True"/>
-  <p:tag name="FILENAME" val=""/>
-  <p:tag name="LATEXENGINEID" val="0"/>
-  <p:tag name="TEMPFOLDER" val="c:\temp\"/>
-  <p:tag name="LATEXFORMHEIGHT" val="312"/>
-  <p:tag name="LATEXFORMWIDTH" val="384"/>
-  <p:tag name="LATEXFORMWRAP" val="True"/>
-  <p:tag name="BITMAPVECTOR" val="0"/>
-</p:tagLst>
-</file>
-
-<file path=ppt/tags/tag16.xml><?xml version="1.0" encoding="utf-8"?>
-<p:tagLst xmlns:a="http://schemas.openxmlformats.org/drawingml/2006/main" xmlns:r="http://schemas.openxmlformats.org/officeDocument/2006/relationships" xmlns:p="http://schemas.openxmlformats.org/presentationml/2006/main">
-  <p:tag name="OUTPUTDPI" val="1200"/>
   <p:tag name="ORIGINALHEIGHT" val="92.2385"/>
   <p:tag name="ORIGINALWIDTH" val="119.2351"/>
   <p:tag name="LATEXADDIN" val="\documentclass{article}&#10;\usepackage{amsmath}&#10;\pagestyle{empty}&#10;\usepackage{bm}&#10;\begin{document}&#10;&#10;$\bm{\pi}_j$&#10;&#10;&#10;\end{document}"/>
@@ -35516,44 +35518,19 @@
 </p:tagLst>
 </file>
 
-<file path=ppt/tags/tag17.xml><?xml version="1.0" encoding="utf-8"?>
+<file path=ppt/tags/tag16.xml><?xml version="1.0" encoding="utf-8"?>
 <p:tagLst xmlns:a="http://schemas.openxmlformats.org/drawingml/2006/main" xmlns:r="http://schemas.openxmlformats.org/officeDocument/2006/relationships" xmlns:p="http://schemas.openxmlformats.org/presentationml/2006/main">
   <p:tag name="TIMING" val="|14.6"/>
 </p:tagLst>
 </file>
 
-<file path=ppt/tags/tag18.xml><?xml version="1.0" encoding="utf-8"?>
-<p:tagLst xmlns:a="http://schemas.openxmlformats.org/drawingml/2006/main" xmlns:r="http://schemas.openxmlformats.org/officeDocument/2006/relationships" xmlns:p="http://schemas.openxmlformats.org/presentationml/2006/main">
-  <p:tag name="OUTPUTDPI" val="1200"/>
-  <p:tag name="ORIGINALHEIGHT" val="83.98952"/>
-  <p:tag name="ORIGINALWIDTH" val="85.48929"/>
-  <p:tag name="LATEXADDIN" val="\documentclass{article}&#10;\usepackage{amsmath}&#10;\pagestyle{empty}&#10;\begin{document}&#10;&#10;$T$&#10;&#10;&#10;\end{document}"/>
-  <p:tag name="IGUANATEXSIZE" val="20"/>
-  <p:tag name="IGUANATEXCURSOR" val="84"/>
-  <p:tag name="TRANSPARENCY" val="True"/>
-  <p:tag name="FILENAME" val=""/>
-  <p:tag name="LATEXENGINEID" val="0"/>
-  <p:tag name="TEMPFOLDER" val="c:\temp\"/>
-  <p:tag name="LATEXFORMHEIGHT" val="312"/>
-  <p:tag name="LATEXFORMWIDTH" val="384"/>
-  <p:tag name="LATEXFORMWRAP" val="True"/>
-  <p:tag name="BITMAPVECTOR" val="0"/>
-</p:tagLst>
-</file>
-
-<file path=ppt/tags/tag19.xml><?xml version="1.0" encoding="utf-8"?>
+<file path=ppt/tags/tag17.xml><?xml version="1.0" encoding="utf-8"?>
 <p:tagLst xmlns:a="http://schemas.openxmlformats.org/drawingml/2006/main" xmlns:r="http://schemas.openxmlformats.org/officeDocument/2006/relationships" xmlns:p="http://schemas.openxmlformats.org/presentationml/2006/main">
   <p:tag name="TIMING" val="|23.6"/>
 </p:tagLst>
 </file>
 
-<file path=ppt/tags/tag2.xml><?xml version="1.0" encoding="utf-8"?>
-<p:tagLst xmlns:a="http://schemas.openxmlformats.org/drawingml/2006/main" xmlns:r="http://schemas.openxmlformats.org/officeDocument/2006/relationships" xmlns:p="http://schemas.openxmlformats.org/presentationml/2006/main">
-  <p:tag name="TIMING" val="|20."/>
-</p:tagLst>
-</file>
-
-<file path=ppt/tags/tag20.xml><?xml version="1.0" encoding="utf-8"?>
+<file path=ppt/tags/tag18.xml><?xml version="1.0" encoding="utf-8"?>
 <p:tagLst xmlns:a="http://schemas.openxmlformats.org/drawingml/2006/main" xmlns:r="http://schemas.openxmlformats.org/officeDocument/2006/relationships" xmlns:p="http://schemas.openxmlformats.org/presentationml/2006/main">
   <p:tag name="OUTPUTDPI" val="1200"/>
   <p:tag name="ORIGINALHEIGHT" val="123.7346"/>
@@ -35572,7 +35549,7 @@
 </p:tagLst>
 </file>
 
-<file path=ppt/tags/tag21.xml><?xml version="1.0" encoding="utf-8"?>
+<file path=ppt/tags/tag19.xml><?xml version="1.0" encoding="utf-8"?>
 <p:tagLst xmlns:a="http://schemas.openxmlformats.org/drawingml/2006/main" xmlns:r="http://schemas.openxmlformats.org/officeDocument/2006/relationships" xmlns:p="http://schemas.openxmlformats.org/presentationml/2006/main">
   <p:tag name="OUTPUTDPI" val="1200"/>
   <p:tag name="ORIGINALHEIGHT" val="224.222"/>
@@ -35591,13 +35568,19 @@
 </p:tagLst>
 </file>
 
-<file path=ppt/tags/tag22.xml><?xml version="1.0" encoding="utf-8"?>
+<file path=ppt/tags/tag2.xml><?xml version="1.0" encoding="utf-8"?>
+<p:tagLst xmlns:a="http://schemas.openxmlformats.org/drawingml/2006/main" xmlns:r="http://schemas.openxmlformats.org/officeDocument/2006/relationships" xmlns:p="http://schemas.openxmlformats.org/presentationml/2006/main">
+  <p:tag name="TIMING" val="|20."/>
+</p:tagLst>
+</file>
+
+<file path=ppt/tags/tag20.xml><?xml version="1.0" encoding="utf-8"?>
 <p:tagLst xmlns:a="http://schemas.openxmlformats.org/drawingml/2006/main" xmlns:r="http://schemas.openxmlformats.org/officeDocument/2006/relationships" xmlns:p="http://schemas.openxmlformats.org/presentationml/2006/main">
   <p:tag name="TIMING" val="|14.6"/>
 </p:tagLst>
 </file>
 
-<file path=ppt/tags/tag23.xml><?xml version="1.0" encoding="utf-8"?>
+<file path=ppt/tags/tag21.xml><?xml version="1.0" encoding="utf-8"?>
 <p:tagLst xmlns:a="http://schemas.openxmlformats.org/drawingml/2006/main" xmlns:r="http://schemas.openxmlformats.org/officeDocument/2006/relationships" xmlns:p="http://schemas.openxmlformats.org/presentationml/2006/main">
   <p:tag name="OUTPUTDPI" val="1200"/>
   <p:tag name="ORIGINALHEIGHT" val="123.7346"/>
@@ -35616,13 +35599,13 @@
 </p:tagLst>
 </file>
 
-<file path=ppt/tags/tag24.xml><?xml version="1.0" encoding="utf-8"?>
+<file path=ppt/tags/tag22.xml><?xml version="1.0" encoding="utf-8"?>
 <p:tagLst xmlns:a="http://schemas.openxmlformats.org/drawingml/2006/main" xmlns:r="http://schemas.openxmlformats.org/officeDocument/2006/relationships" xmlns:p="http://schemas.openxmlformats.org/presentationml/2006/main">
   <p:tag name="TIMING" val="|3.2"/>
 </p:tagLst>
 </file>
 
-<file path=ppt/tags/tag25.xml><?xml version="1.0" encoding="utf-8"?>
+<file path=ppt/tags/tag23.xml><?xml version="1.0" encoding="utf-8"?>
 <p:tagLst xmlns:a="http://schemas.openxmlformats.org/drawingml/2006/main" xmlns:r="http://schemas.openxmlformats.org/officeDocument/2006/relationships" xmlns:p="http://schemas.openxmlformats.org/presentationml/2006/main">
   <p:tag name="OUTPUTDPI" val="1200"/>
   <p:tag name="ORIGINALHEIGHT" val="123.7346"/>
@@ -35641,7 +35624,7 @@
 </p:tagLst>
 </file>
 
-<file path=ppt/tags/tag26.xml><?xml version="1.0" encoding="utf-8"?>
+<file path=ppt/tags/tag24.xml><?xml version="1.0" encoding="utf-8"?>
 <p:tagLst xmlns:a="http://schemas.openxmlformats.org/drawingml/2006/main" xmlns:r="http://schemas.openxmlformats.org/officeDocument/2006/relationships" xmlns:p="http://schemas.openxmlformats.org/presentationml/2006/main">
   <p:tag name="OUTPUTDPI" val="1200"/>
   <p:tag name="ORIGINALHEIGHT" val="123.7346"/>
@@ -35660,7 +35643,7 @@
 </p:tagLst>
 </file>
 
-<file path=ppt/tags/tag27.xml><?xml version="1.0" encoding="utf-8"?>
+<file path=ppt/tags/tag25.xml><?xml version="1.0" encoding="utf-8"?>
 <p:tagLst xmlns:a="http://schemas.openxmlformats.org/drawingml/2006/main" xmlns:r="http://schemas.openxmlformats.org/officeDocument/2006/relationships" xmlns:p="http://schemas.openxmlformats.org/presentationml/2006/main">
   <p:tag name="OUTPUTDPI" val="1200"/>
   <p:tag name="ORIGINALHEIGHT" val="123.7346"/>
@@ -35679,7 +35662,7 @@
 </p:tagLst>
 </file>
 
-<file path=ppt/tags/tag28.xml><?xml version="1.0" encoding="utf-8"?>
+<file path=ppt/tags/tag26.xml><?xml version="1.0" encoding="utf-8"?>
 <p:tagLst xmlns:a="http://schemas.openxmlformats.org/drawingml/2006/main" xmlns:r="http://schemas.openxmlformats.org/officeDocument/2006/relationships" xmlns:p="http://schemas.openxmlformats.org/presentationml/2006/main">
   <p:tag name="OUTPUTDPI" val="1200"/>
   <p:tag name="ORIGINALHEIGHT" val="123.7346"/>
@@ -35698,19 +35681,13 @@
 </p:tagLst>
 </file>
 
-<file path=ppt/tags/tag29.xml><?xml version="1.0" encoding="utf-8"?>
+<file path=ppt/tags/tag27.xml><?xml version="1.0" encoding="utf-8"?>
 <p:tagLst xmlns:a="http://schemas.openxmlformats.org/drawingml/2006/main" xmlns:r="http://schemas.openxmlformats.org/officeDocument/2006/relationships" xmlns:p="http://schemas.openxmlformats.org/presentationml/2006/main">
   <p:tag name="TIMING" val="|14.6"/>
 </p:tagLst>
 </file>
 
-<file path=ppt/tags/tag3.xml><?xml version="1.0" encoding="utf-8"?>
-<p:tagLst xmlns:a="http://schemas.openxmlformats.org/drawingml/2006/main" xmlns:r="http://schemas.openxmlformats.org/officeDocument/2006/relationships" xmlns:p="http://schemas.openxmlformats.org/presentationml/2006/main">
-  <p:tag name="TIMING" val="|14.6"/>
-</p:tagLst>
-</file>
-
-<file path=ppt/tags/tag30.xml><?xml version="1.0" encoding="utf-8"?>
+<file path=ppt/tags/tag28.xml><?xml version="1.0" encoding="utf-8"?>
 <p:tagLst xmlns:a="http://schemas.openxmlformats.org/drawingml/2006/main" xmlns:r="http://schemas.openxmlformats.org/officeDocument/2006/relationships" xmlns:p="http://schemas.openxmlformats.org/presentationml/2006/main">
   <p:tag name="OUTPUTDPI" val="1200"/>
   <p:tag name="ORIGINALHEIGHT" val="123.7346"/>
@@ -35729,7 +35706,7 @@
 </p:tagLst>
 </file>
 
-<file path=ppt/tags/tag31.xml><?xml version="1.0" encoding="utf-8"?>
+<file path=ppt/tags/tag29.xml><?xml version="1.0" encoding="utf-8"?>
 <p:tagLst xmlns:a="http://schemas.openxmlformats.org/drawingml/2006/main" xmlns:r="http://schemas.openxmlformats.org/officeDocument/2006/relationships" xmlns:p="http://schemas.openxmlformats.org/presentationml/2006/main">
   <p:tag name="OUTPUTDPI" val="1200"/>
   <p:tag name="ORIGINALHEIGHT" val="123.7346"/>
@@ -35748,13 +35725,19 @@
 </p:tagLst>
 </file>
 
-<file path=ppt/tags/tag32.xml><?xml version="1.0" encoding="utf-8"?>
+<file path=ppt/tags/tag3.xml><?xml version="1.0" encoding="utf-8"?>
 <p:tagLst xmlns:a="http://schemas.openxmlformats.org/drawingml/2006/main" xmlns:r="http://schemas.openxmlformats.org/officeDocument/2006/relationships" xmlns:p="http://schemas.openxmlformats.org/presentationml/2006/main">
   <p:tag name="TIMING" val="|14.6"/>
 </p:tagLst>
 </file>
 
-<file path=ppt/tags/tag33.xml><?xml version="1.0" encoding="utf-8"?>
+<file path=ppt/tags/tag30.xml><?xml version="1.0" encoding="utf-8"?>
+<p:tagLst xmlns:a="http://schemas.openxmlformats.org/drawingml/2006/main" xmlns:r="http://schemas.openxmlformats.org/officeDocument/2006/relationships" xmlns:p="http://schemas.openxmlformats.org/presentationml/2006/main">
+  <p:tag name="TIMING" val="|14.6"/>
+</p:tagLst>
+</file>
+
+<file path=ppt/tags/tag31.xml><?xml version="1.0" encoding="utf-8"?>
 <p:tagLst xmlns:a="http://schemas.openxmlformats.org/drawingml/2006/main" xmlns:r="http://schemas.openxmlformats.org/officeDocument/2006/relationships" xmlns:p="http://schemas.openxmlformats.org/presentationml/2006/main">
   <p:tag name="OUTPUTDPI" val="1200"/>
   <p:tag name="ORIGINALHEIGHT" val="137.9828"/>
@@ -35773,7 +35756,7 @@
 </p:tagLst>
 </file>
 
-<file path=ppt/tags/tag34.xml><?xml version="1.0" encoding="utf-8"?>
+<file path=ppt/tags/tag32.xml><?xml version="1.0" encoding="utf-8"?>
 <p:tagLst xmlns:a="http://schemas.openxmlformats.org/drawingml/2006/main" xmlns:r="http://schemas.openxmlformats.org/officeDocument/2006/relationships" xmlns:p="http://schemas.openxmlformats.org/presentationml/2006/main">
   <p:tag name="OUTPUTDPI" val="1200"/>
   <p:tag name="ORIGINALHEIGHT" val="101.9872"/>
@@ -35792,7 +35775,7 @@
 </p:tagLst>
 </file>
 
-<file path=ppt/tags/tag35.xml><?xml version="1.0" encoding="utf-8"?>
+<file path=ppt/tags/tag33.xml><?xml version="1.0" encoding="utf-8"?>
 <p:tagLst xmlns:a="http://schemas.openxmlformats.org/drawingml/2006/main" xmlns:r="http://schemas.openxmlformats.org/officeDocument/2006/relationships" xmlns:p="http://schemas.openxmlformats.org/presentationml/2006/main">
   <p:tag name="OUTPUTDPI" val="1200"/>
   <p:tag name="ORIGINALHEIGHT" val="119.985"/>
@@ -35811,7 +35794,7 @@
 </p:tagLst>
 </file>
 
-<file path=ppt/tags/tag36.xml><?xml version="1.0" encoding="utf-8"?>
+<file path=ppt/tags/tag34.xml><?xml version="1.0" encoding="utf-8"?>
 <p:tagLst xmlns:a="http://schemas.openxmlformats.org/drawingml/2006/main" xmlns:r="http://schemas.openxmlformats.org/officeDocument/2006/relationships" xmlns:p="http://schemas.openxmlformats.org/presentationml/2006/main">
   <p:tag name="OUTPUTDPI" val="1200"/>
   <p:tag name="ORIGINALHEIGHT" val="207.724"/>
@@ -35830,7 +35813,7 @@
 </p:tagLst>
 </file>
 
-<file path=ppt/tags/tag37.xml><?xml version="1.0" encoding="utf-8"?>
+<file path=ppt/tags/tag35.xml><?xml version="1.0" encoding="utf-8"?>
 <p:tagLst xmlns:a="http://schemas.openxmlformats.org/drawingml/2006/main" xmlns:r="http://schemas.openxmlformats.org/officeDocument/2006/relationships" xmlns:p="http://schemas.openxmlformats.org/presentationml/2006/main">
   <p:tag name="OUTPUTDPI" val="1200"/>
   <p:tag name="ORIGINALHEIGHT" val="469.4413"/>
@@ -35849,7 +35832,7 @@
 </p:tagLst>
 </file>
 
-<file path=ppt/tags/tag38.xml><?xml version="1.0" encoding="utf-8"?>
+<file path=ppt/tags/tag36.xml><?xml version="1.0" encoding="utf-8"?>
 <p:tagLst xmlns:a="http://schemas.openxmlformats.org/drawingml/2006/main" xmlns:r="http://schemas.openxmlformats.org/officeDocument/2006/relationships" xmlns:p="http://schemas.openxmlformats.org/presentationml/2006/main">
   <p:tag name="OUTPUTDPI" val="1200"/>
   <p:tag name="ORIGINALHEIGHT" val="179.9775"/>
@@ -35868,7 +35851,7 @@
 </p:tagLst>
 </file>
 
-<file path=ppt/tags/tag39.xml><?xml version="1.0" encoding="utf-8"?>
+<file path=ppt/tags/tag37.xml><?xml version="1.0" encoding="utf-8"?>
 <p:tagLst xmlns:a="http://schemas.openxmlformats.org/drawingml/2006/main" xmlns:r="http://schemas.openxmlformats.org/officeDocument/2006/relationships" xmlns:p="http://schemas.openxmlformats.org/presentationml/2006/main">
   <p:tag name="OUTPUTDPI" val="1200"/>
   <p:tag name="ORIGINALHEIGHT" val="155.2306"/>
@@ -35876,6 +35859,44 @@
   <p:tag name="LATEXADDIN" val="\documentclass{article}&#10;\usepackage{amsmath}&#10;\usepackage{bm}&#10;\pagestyle{empty}&#10;\begin{document}&#10;&#10;&#10;$\hat{\bm{v}} = \hat{\bm{P}} \hat{\bm{v}} + \bm{r}_j \ \Rightarrow\ \hat{\bm{v}} = (\bm{I} - \hat{\bm{P}})^{-1} \bm{r}_j$&#10;&#10;\end{document}"/>
   <p:tag name="IGUANATEXSIZE" val="20"/>
   <p:tag name="IGUANATEXCURSOR" val="60"/>
+  <p:tag name="TRANSPARENCY" val="True"/>
+  <p:tag name="FILENAME" val=""/>
+  <p:tag name="LATEXENGINEID" val="0"/>
+  <p:tag name="TEMPFOLDER" val="c:\temp\"/>
+  <p:tag name="LATEXFORMHEIGHT" val="312"/>
+  <p:tag name="LATEXFORMWIDTH" val="384"/>
+  <p:tag name="LATEXFORMWRAP" val="True"/>
+  <p:tag name="BITMAPVECTOR" val="0"/>
+</p:tagLst>
+</file>
+
+<file path=ppt/tags/tag38.xml><?xml version="1.0" encoding="utf-8"?>
+<p:tagLst xmlns:a="http://schemas.openxmlformats.org/drawingml/2006/main" xmlns:r="http://schemas.openxmlformats.org/officeDocument/2006/relationships" xmlns:p="http://schemas.openxmlformats.org/presentationml/2006/main">
+  <p:tag name="OUTPUTDPI" val="1200"/>
+  <p:tag name="ORIGINALHEIGHT" val="231.721"/>
+  <p:tag name="ORIGINALWIDTH" val="2659.917"/>
+  <p:tag name="LATEXADDIN" val="\documentclass{article}&#10;\usepackage{amsmath}&#10;\usepackage{bm}&#10;\pagestyle{empty}&#10;\begin{document}&#10;&#10;$\mathrm{ep}(i\rightarrow j) = \sum\limits_k p_{ik} \cdot v_k = \bm{r}_i^\top (\bm{I} - \hat{\bm{P}})^{-1} \bm{c}_j + p(i,j)$&#10;&#10;&#10;\end{document}"/>
+  <p:tag name="IGUANATEXSIZE" val="20"/>
+  <p:tag name="IGUANATEXCURSOR" val="60"/>
+  <p:tag name="TRANSPARENCY" val="True"/>
+  <p:tag name="FILENAME" val=""/>
+  <p:tag name="LATEXENGINEID" val="0"/>
+  <p:tag name="TEMPFOLDER" val="c:\temp\"/>
+  <p:tag name="LATEXFORMHEIGHT" val="312"/>
+  <p:tag name="LATEXFORMWIDTH" val="384"/>
+  <p:tag name="LATEXFORMWRAP" val="True"/>
+  <p:tag name="BITMAPVECTOR" val="0"/>
+</p:tagLst>
+</file>
+
+<file path=ppt/tags/tag39.xml><?xml version="1.0" encoding="utf-8"?>
+<p:tagLst xmlns:a="http://schemas.openxmlformats.org/drawingml/2006/main" xmlns:r="http://schemas.openxmlformats.org/officeDocument/2006/relationships" xmlns:p="http://schemas.openxmlformats.org/presentationml/2006/main">
+  <p:tag name="OUTPUTDPI" val="1200"/>
+  <p:tag name="ORIGINALHEIGHT" val="137.9828"/>
+  <p:tag name="ORIGINALWIDTH" val="2928.384"/>
+  <p:tag name="LATEXADDIN" val="\documentclass{article}&#10;\usepackage{amsmath}&#10;\usepackage{amssymb}&#10;\pagestyle{empty}&#10;\begin{document}&#10;&#10;$v_k \triangleq $ Pr[A random walk starting at $k$ visits $j$ before $i$]&#10;&#10;&#10;\end{document}"/>
+  <p:tag name="IGUANATEXSIZE" val="20"/>
+  <p:tag name="IGUANATEXCURSOR" val="65"/>
   <p:tag name="TRANSPARENCY" val="True"/>
   <p:tag name="FILENAME" val=""/>
   <p:tag name="LATEXENGINEID" val="0"/>
@@ -35896,44 +35917,6 @@
 <file path=ppt/tags/tag40.xml><?xml version="1.0" encoding="utf-8"?>
 <p:tagLst xmlns:a="http://schemas.openxmlformats.org/drawingml/2006/main" xmlns:r="http://schemas.openxmlformats.org/officeDocument/2006/relationships" xmlns:p="http://schemas.openxmlformats.org/presentationml/2006/main">
   <p:tag name="OUTPUTDPI" val="1200"/>
-  <p:tag name="ORIGINALHEIGHT" val="231.721"/>
-  <p:tag name="ORIGINALWIDTH" val="2659.917"/>
-  <p:tag name="LATEXADDIN" val="\documentclass{article}&#10;\usepackage{amsmath}&#10;\usepackage{bm}&#10;\pagestyle{empty}&#10;\begin{document}&#10;&#10;$\mathrm{ep}(i\rightarrow j) = \sum\limits_k p_{ik} \cdot v_k = \bm{r}_i^\top (\bm{I} - \hat{\bm{P}})^{-1} \bm{c}_j + p(i,j)$&#10;&#10;&#10;\end{document}"/>
-  <p:tag name="IGUANATEXSIZE" val="20"/>
-  <p:tag name="IGUANATEXCURSOR" val="60"/>
-  <p:tag name="TRANSPARENCY" val="True"/>
-  <p:tag name="FILENAME" val=""/>
-  <p:tag name="LATEXENGINEID" val="0"/>
-  <p:tag name="TEMPFOLDER" val="c:\temp\"/>
-  <p:tag name="LATEXFORMHEIGHT" val="312"/>
-  <p:tag name="LATEXFORMWIDTH" val="384"/>
-  <p:tag name="LATEXFORMWRAP" val="True"/>
-  <p:tag name="BITMAPVECTOR" val="0"/>
-</p:tagLst>
-</file>
-
-<file path=ppt/tags/tag41.xml><?xml version="1.0" encoding="utf-8"?>
-<p:tagLst xmlns:a="http://schemas.openxmlformats.org/drawingml/2006/main" xmlns:r="http://schemas.openxmlformats.org/officeDocument/2006/relationships" xmlns:p="http://schemas.openxmlformats.org/presentationml/2006/main">
-  <p:tag name="OUTPUTDPI" val="1200"/>
-  <p:tag name="ORIGINALHEIGHT" val="137.9828"/>
-  <p:tag name="ORIGINALWIDTH" val="2928.384"/>
-  <p:tag name="LATEXADDIN" val="\documentclass{article}&#10;\usepackage{amsmath}&#10;\usepackage{amssymb}&#10;\pagestyle{empty}&#10;\begin{document}&#10;&#10;$v_k \triangleq $ Pr[A random walk starting at $k$ visits $j$ before $i$]&#10;&#10;&#10;\end{document}"/>
-  <p:tag name="IGUANATEXSIZE" val="20"/>
-  <p:tag name="IGUANATEXCURSOR" val="65"/>
-  <p:tag name="TRANSPARENCY" val="True"/>
-  <p:tag name="FILENAME" val=""/>
-  <p:tag name="LATEXENGINEID" val="0"/>
-  <p:tag name="TEMPFOLDER" val="c:\temp\"/>
-  <p:tag name="LATEXFORMHEIGHT" val="312"/>
-  <p:tag name="LATEXFORMWIDTH" val="384"/>
-  <p:tag name="LATEXFORMWRAP" val="True"/>
-  <p:tag name="BITMAPVECTOR" val="0"/>
-</p:tagLst>
-</file>
-
-<file path=ppt/tags/tag42.xml><?xml version="1.0" encoding="utf-8"?>
-<p:tagLst xmlns:a="http://schemas.openxmlformats.org/drawingml/2006/main" xmlns:r="http://schemas.openxmlformats.org/officeDocument/2006/relationships" xmlns:p="http://schemas.openxmlformats.org/presentationml/2006/main">
-  <p:tag name="OUTPUTDPI" val="1200"/>
   <p:tag name="ORIGINALHEIGHT" val="123.7346"/>
   <p:tag name="ORIGINALWIDTH" val="500.9374"/>
   <p:tag name="LATEXADDIN" val="\documentclass{article}&#10;\usepackage{amsmath}&#10;\pagestyle{empty}&#10;\begin{document}&#10;&#10;$\mathrm{ep}(i \rightarrow j)$&#10;&#10;&#10;\end{document}"/>
@@ -35950,7 +35933,7 @@
 </p:tagLst>
 </file>
 
-<file path=ppt/tags/tag43.xml><?xml version="1.0" encoding="utf-8"?>
+<file path=ppt/tags/tag41.xml><?xml version="1.0" encoding="utf-8"?>
 <p:tagLst xmlns:a="http://schemas.openxmlformats.org/drawingml/2006/main" xmlns:r="http://schemas.openxmlformats.org/officeDocument/2006/relationships" xmlns:p="http://schemas.openxmlformats.org/presentationml/2006/main">
   <p:tag name="OUTPUTDPI" val="1200"/>
   <p:tag name="ORIGINALHEIGHT" val="134.2332"/>
@@ -35969,13 +35952,13 @@
 </p:tagLst>
 </file>
 
-<file path=ppt/tags/tag44.xml><?xml version="1.0" encoding="utf-8"?>
+<file path=ppt/tags/tag42.xml><?xml version="1.0" encoding="utf-8"?>
 <p:tagLst xmlns:a="http://schemas.openxmlformats.org/drawingml/2006/main" xmlns:r="http://schemas.openxmlformats.org/officeDocument/2006/relationships" xmlns:p="http://schemas.openxmlformats.org/presentationml/2006/main">
   <p:tag name="TIMING" val="|14.6"/>
 </p:tagLst>
 </file>
 
-<file path=ppt/tags/tag45.xml><?xml version="1.0" encoding="utf-8"?>
+<file path=ppt/tags/tag43.xml><?xml version="1.0" encoding="utf-8"?>
 <p:tagLst xmlns:a="http://schemas.openxmlformats.org/drawingml/2006/main" xmlns:r="http://schemas.openxmlformats.org/officeDocument/2006/relationships" xmlns:p="http://schemas.openxmlformats.org/presentationml/2006/main">
   <p:tag name="OUTPUTDPI" val="1200"/>
   <p:tag name="ORIGINALHEIGHT" val="127.3152"/>
@@ -35994,7 +35977,7 @@
 </p:tagLst>
 </file>
 
-<file path=ppt/tags/tag46.xml><?xml version="1.0" encoding="utf-8"?>
+<file path=ppt/tags/tag44.xml><?xml version="1.0" encoding="utf-8"?>
 <p:tagLst xmlns:a="http://schemas.openxmlformats.org/drawingml/2006/main" xmlns:r="http://schemas.openxmlformats.org/officeDocument/2006/relationships" xmlns:p="http://schemas.openxmlformats.org/presentationml/2006/main">
   <p:tag name="OUTPUTDPI" val="1200"/>
   <p:tag name="ORIGINALHEIGHT" val="133.4833"/>
@@ -36013,7 +35996,7 @@
 </p:tagLst>
 </file>
 
-<file path=ppt/tags/tag47.xml><?xml version="1.0" encoding="utf-8"?>
+<file path=ppt/tags/tag45.xml><?xml version="1.0" encoding="utf-8"?>
 <p:tagLst xmlns:a="http://schemas.openxmlformats.org/drawingml/2006/main" xmlns:r="http://schemas.openxmlformats.org/officeDocument/2006/relationships" xmlns:p="http://schemas.openxmlformats.org/presentationml/2006/main">
   <p:tag name="OUTPUTDPI" val="1200"/>
   <p:tag name="ORIGINALHEIGHT" val="191.2261"/>
@@ -36032,7 +36015,7 @@
 </p:tagLst>
 </file>
 
-<file path=ppt/tags/tag48.xml><?xml version="1.0" encoding="utf-8"?>
+<file path=ppt/tags/tag46.xml><?xml version="1.0" encoding="utf-8"?>
 <p:tagLst xmlns:a="http://schemas.openxmlformats.org/drawingml/2006/main" xmlns:r="http://schemas.openxmlformats.org/officeDocument/2006/relationships" xmlns:p="http://schemas.openxmlformats.org/presentationml/2006/main">
   <p:tag name="OUTPUTDPI" val="1200"/>
   <p:tag name="ORIGINALHEIGHT" val="134.2332"/>
@@ -36051,9 +36034,47 @@
 </p:tagLst>
 </file>
 
+<file path=ppt/tags/tag47.xml><?xml version="1.0" encoding="utf-8"?>
+<p:tagLst xmlns:a="http://schemas.openxmlformats.org/drawingml/2006/main" xmlns:r="http://schemas.openxmlformats.org/officeDocument/2006/relationships" xmlns:p="http://schemas.openxmlformats.org/presentationml/2006/main">
+  <p:tag name="TIMING" val="|14.6"/>
+</p:tagLst>
+</file>
+
+<file path=ppt/tags/tag48.xml><?xml version="1.0" encoding="utf-8"?>
+<p:tagLst xmlns:a="http://schemas.openxmlformats.org/drawingml/2006/main" xmlns:r="http://schemas.openxmlformats.org/officeDocument/2006/relationships" xmlns:p="http://schemas.openxmlformats.org/presentationml/2006/main">
+  <p:tag name="OUTPUTDPI" val="1200"/>
+  <p:tag name="ORIGINALHEIGHT" val="127.3152"/>
+  <p:tag name="ORIGINALWIDTH" val="719.3802"/>
+  <p:tag name="LATEXADDIN" val="\documentclass{article}&#10;\usepackage{amsmath}&#10;\pagestyle{empty}&#10;\usepackage{amssymb}&#10;\usepackage{amsthm}&#10;\usepackage{bm}&#10;&#10;\newtheorem*{mythm*}{Theorem}&#10;\newtheorem*{mylem*}{Lemma}&#10;\newtheorem*{mycor*}{Corollary}&#10;&#10;\begin{document}&#10;&#10;\begin{mythm*}&#10;Let&#10;$&#10;\bm{Q} = \left[ q(i,j) \right] \triangleq (\bm{I} - c\bm{P})^{-1}.&#10;$&#10;$\forall i\neq j$, there is&#10;\[&#10;\mathrm{ep}(i\rightarrow j) = \frac{q(i,j)}{q(i,i)q(j,j) - q(i,j)q(j,i)}.&#10;\]&#10;\end{mythm*}&#10;&#10;&#10;\end{document}"/>
+  <p:tag name="IGUANATEXSIZE" val="20"/>
+  <p:tag name="IGUANATEXCURSOR" val="319"/>
+  <p:tag name="TRANSPARENCY" val="True"/>
+  <p:tag name="FILENAME" val=""/>
+  <p:tag name="LATEXENGINEID" val="0"/>
+  <p:tag name="TEMPFOLDER" val="c:\temp\"/>
+  <p:tag name="LATEXFORMHEIGHT" val="312"/>
+  <p:tag name="LATEXFORMWIDTH" val="384"/>
+  <p:tag name="LATEXFORMWRAP" val="True"/>
+  <p:tag name="BITMAPVECTOR" val="0"/>
+</p:tagLst>
+</file>
+
 <file path=ppt/tags/tag49.xml><?xml version="1.0" encoding="utf-8"?>
 <p:tagLst xmlns:a="http://schemas.openxmlformats.org/drawingml/2006/main" xmlns:r="http://schemas.openxmlformats.org/officeDocument/2006/relationships" xmlns:p="http://schemas.openxmlformats.org/presentationml/2006/main">
-  <p:tag name="TIMING" val="|14.6"/>
+  <p:tag name="OUTPUTDPI" val="1200"/>
+  <p:tag name="ORIGINALHEIGHT" val="140.9824"/>
+  <p:tag name="ORIGINALWIDTH" val="1918.26"/>
+  <p:tag name="LATEXADDIN" val="\documentclass{article}&#10;\usepackage{amsmath}&#10;\usepackage{bm}&#10;\pagestyle{empty}&#10;\begin{document}&#10;&#10;\[(\bm{I} - c\bm{P})^{-1} = \bm{I} + c\bm{P} + (c\bm{P})^2 + \cdots\]&#10;&#10;&#10;\end{document}"/>
+  <p:tag name="IGUANATEXSIZE" val="20"/>
+  <p:tag name="IGUANATEXCURSOR" val="60"/>
+  <p:tag name="TRANSPARENCY" val="True"/>
+  <p:tag name="FILENAME" val=""/>
+  <p:tag name="LATEXENGINEID" val="0"/>
+  <p:tag name="TEMPFOLDER" val="c:\temp\"/>
+  <p:tag name="LATEXFORMHEIGHT" val="312"/>
+  <p:tag name="LATEXFORMWIDTH" val="384"/>
+  <p:tag name="LATEXFORMWRAP" val="True"/>
+  <p:tag name="BITMAPVECTOR" val="0"/>
 </p:tagLst>
 </file>
 
@@ -36079,44 +36100,6 @@
 <file path=ppt/tags/tag50.xml><?xml version="1.0" encoding="utf-8"?>
 <p:tagLst xmlns:a="http://schemas.openxmlformats.org/drawingml/2006/main" xmlns:r="http://schemas.openxmlformats.org/officeDocument/2006/relationships" xmlns:p="http://schemas.openxmlformats.org/presentationml/2006/main">
   <p:tag name="OUTPUTDPI" val="1200"/>
-  <p:tag name="ORIGINALHEIGHT" val="127.3152"/>
-  <p:tag name="ORIGINALWIDTH" val="719.3802"/>
-  <p:tag name="LATEXADDIN" val="\documentclass{article}&#10;\usepackage{amsmath}&#10;\pagestyle{empty}&#10;\usepackage{amssymb}&#10;\usepackage{amsthm}&#10;\usepackage{bm}&#10;&#10;\newtheorem*{mythm*}{Theorem}&#10;\newtheorem*{mylem*}{Lemma}&#10;\newtheorem*{mycor*}{Corollary}&#10;&#10;\begin{document}&#10;&#10;\begin{mythm*}&#10;Let&#10;$&#10;\bm{Q} = \left[ q(i,j) \right] \triangleq (\bm{I} - c\bm{P})^{-1}.&#10;$&#10;$\forall i\neq j$, there is&#10;\[&#10;\mathrm{ep}(i\rightarrow j) = \frac{q(i,j)}{q(i,i)q(j,j) - q(i,j)q(j,i)}.&#10;\]&#10;\end{mythm*}&#10;&#10;&#10;\end{document}"/>
-  <p:tag name="IGUANATEXSIZE" val="20"/>
-  <p:tag name="IGUANATEXCURSOR" val="319"/>
-  <p:tag name="TRANSPARENCY" val="True"/>
-  <p:tag name="FILENAME" val=""/>
-  <p:tag name="LATEXENGINEID" val="0"/>
-  <p:tag name="TEMPFOLDER" val="c:\temp\"/>
-  <p:tag name="LATEXFORMHEIGHT" val="312"/>
-  <p:tag name="LATEXFORMWIDTH" val="384"/>
-  <p:tag name="LATEXFORMWRAP" val="True"/>
-  <p:tag name="BITMAPVECTOR" val="0"/>
-</p:tagLst>
-</file>
-
-<file path=ppt/tags/tag51.xml><?xml version="1.0" encoding="utf-8"?>
-<p:tagLst xmlns:a="http://schemas.openxmlformats.org/drawingml/2006/main" xmlns:r="http://schemas.openxmlformats.org/officeDocument/2006/relationships" xmlns:p="http://schemas.openxmlformats.org/presentationml/2006/main">
-  <p:tag name="OUTPUTDPI" val="1200"/>
-  <p:tag name="ORIGINALHEIGHT" val="140.9824"/>
-  <p:tag name="ORIGINALWIDTH" val="1918.26"/>
-  <p:tag name="LATEXADDIN" val="\documentclass{article}&#10;\usepackage{amsmath}&#10;\usepackage{bm}&#10;\pagestyle{empty}&#10;\begin{document}&#10;&#10;\[(\bm{I} - c\bm{P})^{-1} = \bm{I} + c\bm{P} + (c\bm{P})^2 + \cdots\]&#10;&#10;&#10;\end{document}"/>
-  <p:tag name="IGUANATEXSIZE" val="20"/>
-  <p:tag name="IGUANATEXCURSOR" val="60"/>
-  <p:tag name="TRANSPARENCY" val="True"/>
-  <p:tag name="FILENAME" val=""/>
-  <p:tag name="LATEXENGINEID" val="0"/>
-  <p:tag name="TEMPFOLDER" val="c:\temp\"/>
-  <p:tag name="LATEXFORMHEIGHT" val="312"/>
-  <p:tag name="LATEXFORMWIDTH" val="384"/>
-  <p:tag name="LATEXFORMWRAP" val="True"/>
-  <p:tag name="BITMAPVECTOR" val="0"/>
-</p:tagLst>
-</file>
-
-<file path=ppt/tags/tag52.xml><?xml version="1.0" encoding="utf-8"?>
-<p:tagLst xmlns:a="http://schemas.openxmlformats.org/drawingml/2006/main" xmlns:r="http://schemas.openxmlformats.org/officeDocument/2006/relationships" xmlns:p="http://schemas.openxmlformats.org/presentationml/2006/main">
-  <p:tag name="OUTPUTDPI" val="1200"/>
   <p:tag name="ORIGINALHEIGHT" val="140.9824"/>
   <p:tag name="ORIGINALWIDTH" val="2676.416"/>
   <p:tag name="LATEXADDIN" val="\documentclass{article}&#10;\usepackage{amsmath}&#10;\pagestyle{empty}&#10;\usepackage{bm}&#10;\begin{document}&#10;&#10;\begin{align*}&#10;\bm{Q}\bm{e}_i &amp;= (\bm{I} - c\bm{P})^{-1} \bm{e}_i = \bm{e}_i + c\bm{P} \bm{e}_i + (c\bm{P})^2 \bm{e}_i + \cdots&#10;\end{align*}&#10;&#10;&#10;\end{document}"/>
@@ -36133,7 +36116,7 @@
 </p:tagLst>
 </file>
 
-<file path=ppt/tags/tag53.xml><?xml version="1.0" encoding="utf-8"?>
+<file path=ppt/tags/tag51.xml><?xml version="1.0" encoding="utf-8"?>
 <p:tagLst xmlns:a="http://schemas.openxmlformats.org/drawingml/2006/main" xmlns:r="http://schemas.openxmlformats.org/officeDocument/2006/relationships" xmlns:p="http://schemas.openxmlformats.org/presentationml/2006/main">
   <p:tag name="OUTPUTDPI" val="1200"/>
   <p:tag name="ORIGINALHEIGHT" val="123.7346"/>
@@ -36152,9 +36135,47 @@
 </p:tagLst>
 </file>
 
+<file path=ppt/tags/tag52.xml><?xml version="1.0" encoding="utf-8"?>
+<p:tagLst xmlns:a="http://schemas.openxmlformats.org/drawingml/2006/main" xmlns:r="http://schemas.openxmlformats.org/officeDocument/2006/relationships" xmlns:p="http://schemas.openxmlformats.org/presentationml/2006/main">
+  <p:tag name="TIMING" val="|34.9"/>
+</p:tagLst>
+</file>
+
+<file path=ppt/tags/tag53.xml><?xml version="1.0" encoding="utf-8"?>
+<p:tagLst xmlns:a="http://schemas.openxmlformats.org/drawingml/2006/main" xmlns:r="http://schemas.openxmlformats.org/officeDocument/2006/relationships" xmlns:p="http://schemas.openxmlformats.org/presentationml/2006/main">
+  <p:tag name="OUTPUTDPI" val="1200"/>
+  <p:tag name="ORIGINALHEIGHT" val="123.7346"/>
+  <p:tag name="ORIGINALWIDTH" val="1169.104"/>
+  <p:tag name="LATEXADDIN" val="\documentclass{article}&#10;\usepackage{amsmath}&#10;\pagestyle{empty}&#10;\begin{document}&#10;&#10;$\mathrm{ep}(i \rightarrow j) + \mathrm{ep}(j \rightarrow i)$&#10;&#10;&#10;\end{document}"/>
+  <p:tag name="IGUANATEXSIZE" val="24"/>
+  <p:tag name="IGUANATEXCURSOR" val="140"/>
+  <p:tag name="TRANSPARENCY" val="True"/>
+  <p:tag name="FILENAME" val=""/>
+  <p:tag name="LATEXENGINEID" val="0"/>
+  <p:tag name="TEMPFOLDER" val="c:\temp\"/>
+  <p:tag name="LATEXFORMHEIGHT" val="312"/>
+  <p:tag name="LATEXFORMWIDTH" val="384"/>
+  <p:tag name="LATEXFORMWRAP" val="True"/>
+  <p:tag name="BITMAPVECTOR" val="0"/>
+</p:tagLst>
+</file>
+
 <file path=ppt/tags/tag54.xml><?xml version="1.0" encoding="utf-8"?>
 <p:tagLst xmlns:a="http://schemas.openxmlformats.org/drawingml/2006/main" xmlns:r="http://schemas.openxmlformats.org/officeDocument/2006/relationships" xmlns:p="http://schemas.openxmlformats.org/presentationml/2006/main">
-  <p:tag name="TIMING" val="|34.9"/>
+  <p:tag name="OUTPUTDPI" val="1200"/>
+  <p:tag name="ORIGINALHEIGHT" val="123.7346"/>
+  <p:tag name="ORIGINALWIDTH" val="1169.104"/>
+  <p:tag name="LATEXADDIN" val="\documentclass{article}&#10;\usepackage{amsmath}&#10;\pagestyle{empty}&#10;\begin{document}&#10;&#10;$\mathrm{ep}(i \rightarrow j) + \mathrm{ep}(j \rightarrow i)$&#10;&#10;&#10;\end{document}"/>
+  <p:tag name="IGUANATEXSIZE" val="24"/>
+  <p:tag name="IGUANATEXCURSOR" val="140"/>
+  <p:tag name="TRANSPARENCY" val="True"/>
+  <p:tag name="FILENAME" val=""/>
+  <p:tag name="LATEXENGINEID" val="0"/>
+  <p:tag name="TEMPFOLDER" val="c:\temp\"/>
+  <p:tag name="LATEXFORMHEIGHT" val="312"/>
+  <p:tag name="LATEXFORMWIDTH" val="384"/>
+  <p:tag name="LATEXFORMWRAP" val="True"/>
+  <p:tag name="BITMAPVECTOR" val="0"/>
 </p:tagLst>
 </file>
 
@@ -36179,20 +36200,7 @@
 
 <file path=ppt/tags/tag56.xml><?xml version="1.0" encoding="utf-8"?>
 <p:tagLst xmlns:a="http://schemas.openxmlformats.org/drawingml/2006/main" xmlns:r="http://schemas.openxmlformats.org/officeDocument/2006/relationships" xmlns:p="http://schemas.openxmlformats.org/presentationml/2006/main">
-  <p:tag name="OUTPUTDPI" val="1200"/>
-  <p:tag name="ORIGINALHEIGHT" val="123.7346"/>
-  <p:tag name="ORIGINALWIDTH" val="1169.104"/>
-  <p:tag name="LATEXADDIN" val="\documentclass{article}&#10;\usepackage{amsmath}&#10;\pagestyle{empty}&#10;\begin{document}&#10;&#10;$\mathrm{ep}(i \rightarrow j) + \mathrm{ep}(j \rightarrow i)$&#10;&#10;&#10;\end{document}"/>
-  <p:tag name="IGUANATEXSIZE" val="24"/>
-  <p:tag name="IGUANATEXCURSOR" val="140"/>
-  <p:tag name="TRANSPARENCY" val="True"/>
-  <p:tag name="FILENAME" val=""/>
-  <p:tag name="LATEXENGINEID" val="0"/>
-  <p:tag name="TEMPFOLDER" val="c:\temp\"/>
-  <p:tag name="LATEXFORMHEIGHT" val="312"/>
-  <p:tag name="LATEXFORMWIDTH" val="384"/>
-  <p:tag name="LATEXFORMWRAP" val="True"/>
-  <p:tag name="BITMAPVECTOR" val="0"/>
+  <p:tag name="TIMING" val="|36.8|20.5"/>
 </p:tagLst>
 </file>
 
@@ -36200,10 +36208,10 @@
 <p:tagLst xmlns:a="http://schemas.openxmlformats.org/drawingml/2006/main" xmlns:r="http://schemas.openxmlformats.org/officeDocument/2006/relationships" xmlns:p="http://schemas.openxmlformats.org/presentationml/2006/main">
   <p:tag name="OUTPUTDPI" val="1200"/>
   <p:tag name="ORIGINALHEIGHT" val="123.7346"/>
-  <p:tag name="ORIGINALWIDTH" val="1169.104"/>
-  <p:tag name="LATEXADDIN" val="\documentclass{article}&#10;\usepackage{amsmath}&#10;\pagestyle{empty}&#10;\begin{document}&#10;&#10;$\mathrm{ep}(i \rightarrow j) + \mathrm{ep}(j \rightarrow i)$&#10;&#10;&#10;\end{document}"/>
+  <p:tag name="ORIGINALWIDTH" val="500.9374"/>
+  <p:tag name="LATEXADDIN" val="\documentclass{article}&#10;\usepackage{amsmath}&#10;\pagestyle{empty}&#10;\begin{document}&#10;&#10;$\mathrm{ep}(i \rightarrow j)$&#10;&#10;&#10;\end{document}"/>
   <p:tag name="IGUANATEXSIZE" val="24"/>
-  <p:tag name="IGUANATEXCURSOR" val="140"/>
+  <p:tag name="IGUANATEXCURSOR" val="111"/>
   <p:tag name="TRANSPARENCY" val="True"/>
   <p:tag name="FILENAME" val=""/>
   <p:tag name="LATEXENGINEID" val="0"/>
@@ -36217,7 +36225,20 @@
 
 <file path=ppt/tags/tag58.xml><?xml version="1.0" encoding="utf-8"?>
 <p:tagLst xmlns:a="http://schemas.openxmlformats.org/drawingml/2006/main" xmlns:r="http://schemas.openxmlformats.org/officeDocument/2006/relationships" xmlns:p="http://schemas.openxmlformats.org/presentationml/2006/main">
-  <p:tag name="TIMING" val="|36.8|20.5"/>
+  <p:tag name="OUTPUTDPI" val="1200"/>
+  <p:tag name="ORIGINALHEIGHT" val="123.7346"/>
+  <p:tag name="ORIGINALWIDTH" val="500.9374"/>
+  <p:tag name="LATEXADDIN" val="\documentclass{article}&#10;\usepackage{amsmath}&#10;\pagestyle{empty}&#10;\begin{document}&#10;&#10;$\mathrm{ep}(j \rightarrow i)$&#10;&#10;&#10;\end{document}"/>
+  <p:tag name="IGUANATEXSIZE" val="24"/>
+  <p:tag name="IGUANATEXCURSOR" val="95"/>
+  <p:tag name="TRANSPARENCY" val="True"/>
+  <p:tag name="FILENAME" val=""/>
+  <p:tag name="LATEXENGINEID" val="0"/>
+  <p:tag name="TEMPFOLDER" val="c:\temp\"/>
+  <p:tag name="LATEXFORMHEIGHT" val="312"/>
+  <p:tag name="LATEXFORMWIDTH" val="384"/>
+  <p:tag name="LATEXFORMWRAP" val="True"/>
+  <p:tag name="BITMAPVECTOR" val="0"/>
 </p:tagLst>
 </file>
 
@@ -36225,10 +36246,10 @@
 <p:tagLst xmlns:a="http://schemas.openxmlformats.org/drawingml/2006/main" xmlns:r="http://schemas.openxmlformats.org/officeDocument/2006/relationships" xmlns:p="http://schemas.openxmlformats.org/presentationml/2006/main">
   <p:tag name="OUTPUTDPI" val="1200"/>
   <p:tag name="ORIGINALHEIGHT" val="123.7346"/>
-  <p:tag name="ORIGINALWIDTH" val="500.9374"/>
-  <p:tag name="LATEXADDIN" val="\documentclass{article}&#10;\usepackage{amsmath}&#10;\pagestyle{empty}&#10;\begin{document}&#10;&#10;$\mathrm{ep}(i \rightarrow j)$&#10;&#10;&#10;\end{document}"/>
-  <p:tag name="IGUANATEXSIZE" val="24"/>
-  <p:tag name="IGUANATEXCURSOR" val="111"/>
+  <p:tag name="ORIGINALWIDTH" val="1169.104"/>
+  <p:tag name="LATEXADDIN" val="\documentclass{article}&#10;\usepackage{amsmath}&#10;\usepackage{color}&#10;\pagestyle{empty}&#10;\begin{document}&#10;&#10;\definecolor{orange}{rgb}{0.5,0,0}&#10;&#10;{\color{orange}&#10;$\mathrm{ep}(i \rightarrow j) - \mathrm{ep}(j \rightarrow i)$&#10;}&#10;&#10;\end{document}"/>
+  <p:tag name="IGUANATEXSIZE" val="20"/>
+  <p:tag name="IGUANATEXCURSOR" val="129"/>
   <p:tag name="TRANSPARENCY" val="True"/>
   <p:tag name="FILENAME" val=""/>
   <p:tag name="LATEXENGINEID" val="0"/>
@@ -36261,49 +36282,11 @@
 
 <file path=ppt/tags/tag60.xml><?xml version="1.0" encoding="utf-8"?>
 <p:tagLst xmlns:a="http://schemas.openxmlformats.org/drawingml/2006/main" xmlns:r="http://schemas.openxmlformats.org/officeDocument/2006/relationships" xmlns:p="http://schemas.openxmlformats.org/presentationml/2006/main">
-  <p:tag name="OUTPUTDPI" val="1200"/>
-  <p:tag name="ORIGINALHEIGHT" val="123.7346"/>
-  <p:tag name="ORIGINALWIDTH" val="500.9374"/>
-  <p:tag name="LATEXADDIN" val="\documentclass{article}&#10;\usepackage{amsmath}&#10;\pagestyle{empty}&#10;\begin{document}&#10;&#10;$\mathrm{ep}(j \rightarrow i)$&#10;&#10;&#10;\end{document}"/>
-  <p:tag name="IGUANATEXSIZE" val="24"/>
-  <p:tag name="IGUANATEXCURSOR" val="95"/>
-  <p:tag name="TRANSPARENCY" val="True"/>
-  <p:tag name="FILENAME" val=""/>
-  <p:tag name="LATEXENGINEID" val="0"/>
-  <p:tag name="TEMPFOLDER" val="c:\temp\"/>
-  <p:tag name="LATEXFORMHEIGHT" val="312"/>
-  <p:tag name="LATEXFORMWIDTH" val="384"/>
-  <p:tag name="LATEXFORMWRAP" val="True"/>
-  <p:tag name="BITMAPVECTOR" val="0"/>
+  <p:tag name="TIMING" val="|14.6"/>
 </p:tagLst>
 </file>
 
 <file path=ppt/tags/tag61.xml><?xml version="1.0" encoding="utf-8"?>
-<p:tagLst xmlns:a="http://schemas.openxmlformats.org/drawingml/2006/main" xmlns:r="http://schemas.openxmlformats.org/officeDocument/2006/relationships" xmlns:p="http://schemas.openxmlformats.org/presentationml/2006/main">
-  <p:tag name="OUTPUTDPI" val="1200"/>
-  <p:tag name="ORIGINALHEIGHT" val="123.7346"/>
-  <p:tag name="ORIGINALWIDTH" val="1169.104"/>
-  <p:tag name="LATEXADDIN" val="\documentclass{article}&#10;\usepackage{amsmath}&#10;\usepackage{color}&#10;\pagestyle{empty}&#10;\begin{document}&#10;&#10;\definecolor{orange}{rgb}{0.5,0,0}&#10;&#10;{\color{orange}&#10;$\mathrm{ep}(i \rightarrow j) - \mathrm{ep}(j \rightarrow i)$&#10;}&#10;&#10;\end{document}"/>
-  <p:tag name="IGUANATEXSIZE" val="20"/>
-  <p:tag name="IGUANATEXCURSOR" val="129"/>
-  <p:tag name="TRANSPARENCY" val="True"/>
-  <p:tag name="FILENAME" val=""/>
-  <p:tag name="LATEXENGINEID" val="0"/>
-  <p:tag name="TEMPFOLDER" val="c:\temp\"/>
-  <p:tag name="LATEXFORMHEIGHT" val="312"/>
-  <p:tag name="LATEXFORMWIDTH" val="384"/>
-  <p:tag name="LATEXFORMWRAP" val="True"/>
-  <p:tag name="BITMAPVECTOR" val="0"/>
-</p:tagLst>
-</file>
-
-<file path=ppt/tags/tag62.xml><?xml version="1.0" encoding="utf-8"?>
-<p:tagLst xmlns:a="http://schemas.openxmlformats.org/drawingml/2006/main" xmlns:r="http://schemas.openxmlformats.org/officeDocument/2006/relationships" xmlns:p="http://schemas.openxmlformats.org/presentationml/2006/main">
-  <p:tag name="TIMING" val="|14.6"/>
-</p:tagLst>
-</file>
-
-<file path=ppt/tags/tag63.xml><?xml version="1.0" encoding="utf-8"?>
 <p:tagLst xmlns:a="http://schemas.openxmlformats.org/drawingml/2006/main" xmlns:r="http://schemas.openxmlformats.org/officeDocument/2006/relationships" xmlns:p="http://schemas.openxmlformats.org/presentationml/2006/main">
   <p:tag name="OUTPUTDPI" val="1200"/>
   <p:tag name="ORIGINALHEIGHT" val="111.9327"/>
@@ -36322,7 +36305,7 @@
 </p:tagLst>
 </file>
 
-<file path=ppt/tags/tag64.xml><?xml version="1.0" encoding="utf-8"?>
+<file path=ppt/tags/tag62.xml><?xml version="1.0" encoding="utf-8"?>
 <p:tagLst xmlns:a="http://schemas.openxmlformats.org/drawingml/2006/main" xmlns:r="http://schemas.openxmlformats.org/officeDocument/2006/relationships" xmlns:p="http://schemas.openxmlformats.org/presentationml/2006/main">
   <p:tag name="OUTPUTDPI" val="1200"/>
   <p:tag name="ORIGINALHEIGHT" val="56.24299"/>
@@ -36341,7 +36324,7 @@
 </p:tagLst>
 </file>
 
-<file path=ppt/tags/tag65.xml><?xml version="1.0" encoding="utf-8"?>
+<file path=ppt/tags/tag63.xml><?xml version="1.0" encoding="utf-8"?>
 <p:tagLst xmlns:a="http://schemas.openxmlformats.org/drawingml/2006/main" xmlns:r="http://schemas.openxmlformats.org/officeDocument/2006/relationships" xmlns:p="http://schemas.openxmlformats.org/presentationml/2006/main">
   <p:tag name="OUTPUTDPI" val="1200"/>
   <p:tag name="ORIGINALHEIGHT" val="103.4871"/>
@@ -36360,7 +36343,7 @@
 </p:tagLst>
 </file>
 
-<file path=ppt/tags/tag66.xml><?xml version="1.0" encoding="utf-8"?>
+<file path=ppt/tags/tag64.xml><?xml version="1.0" encoding="utf-8"?>
 <p:tagLst xmlns:a="http://schemas.openxmlformats.org/drawingml/2006/main" xmlns:r="http://schemas.openxmlformats.org/officeDocument/2006/relationships" xmlns:p="http://schemas.openxmlformats.org/presentationml/2006/main">
   <p:tag name="OUTPUTDPI" val="1200"/>
   <p:tag name="ORIGINALHEIGHT" val="164.2294"/>
@@ -36379,13 +36362,13 @@
 </p:tagLst>
 </file>
 
-<file path=ppt/tags/tag67.xml><?xml version="1.0" encoding="utf-8"?>
+<file path=ppt/tags/tag65.xml><?xml version="1.0" encoding="utf-8"?>
 <p:tagLst xmlns:a="http://schemas.openxmlformats.org/drawingml/2006/main" xmlns:r="http://schemas.openxmlformats.org/officeDocument/2006/relationships" xmlns:p="http://schemas.openxmlformats.org/presentationml/2006/main">
   <p:tag name="TIMING" val="|14.6"/>
 </p:tagLst>
 </file>
 
-<file path=ppt/tags/tag68.xml><?xml version="1.0" encoding="utf-8"?>
+<file path=ppt/tags/tag66.xml><?xml version="1.0" encoding="utf-8"?>
 <p:tagLst xmlns:a="http://schemas.openxmlformats.org/drawingml/2006/main" xmlns:r="http://schemas.openxmlformats.org/officeDocument/2006/relationships" xmlns:p="http://schemas.openxmlformats.org/presentationml/2006/main">
   <p:tag name="OUTPUTDPI" val="1200"/>
   <p:tag name="ORIGINALHEIGHT" val="156.7712"/>
@@ -36404,7 +36387,7 @@
 </p:tagLst>
 </file>
 
-<file path=ppt/tags/tag69.xml><?xml version="1.0" encoding="utf-8"?>
+<file path=ppt/tags/tag67.xml><?xml version="1.0" encoding="utf-8"?>
 <p:tagLst xmlns:a="http://schemas.openxmlformats.org/drawingml/2006/main" xmlns:r="http://schemas.openxmlformats.org/officeDocument/2006/relationships" xmlns:p="http://schemas.openxmlformats.org/presentationml/2006/main">
   <p:tag name="OUTPUTDPI" val="1200"/>
   <p:tag name="ORIGINALHEIGHT" val="163.4795"/>
@@ -36412,6 +36395,44 @@
   <p:tag name="LATEXADDIN" val="\documentclass{article}&#10;\usepackage{amsmath}&#10;\pagestyle{empty}&#10;\begin{document}&#10;&#10;$E(X) = \frac{1}{\pi_i}$&#10;&#10;&#10;\end{document}"/>
   <p:tag name="IGUANATEXSIZE" val="20"/>
   <p:tag name="IGUANATEXCURSOR" val="105"/>
+  <p:tag name="TRANSPARENCY" val="True"/>
+  <p:tag name="FILENAME" val=""/>
+  <p:tag name="LATEXENGINEID" val="0"/>
+  <p:tag name="TEMPFOLDER" val="c:\temp\"/>
+  <p:tag name="LATEXFORMHEIGHT" val="312"/>
+  <p:tag name="LATEXFORMWIDTH" val="384"/>
+  <p:tag name="LATEXFORMWRAP" val="True"/>
+  <p:tag name="BITMAPVECTOR" val="0"/>
+</p:tagLst>
+</file>
+
+<file path=ppt/tags/tag68.xml><?xml version="1.0" encoding="utf-8"?>
+<p:tagLst xmlns:a="http://schemas.openxmlformats.org/drawingml/2006/main" xmlns:r="http://schemas.openxmlformats.org/officeDocument/2006/relationships" xmlns:p="http://schemas.openxmlformats.org/presentationml/2006/main">
+  <p:tag name="OUTPUTDPI" val="1200"/>
+  <p:tag name="ORIGINALHEIGHT" val="123.7346"/>
+  <p:tag name="ORIGINALWIDTH" val="752.156"/>
+  <p:tag name="LATEXADDIN" val="\documentclass{article}&#10;\usepackage{amsmath}&#10;\pagestyle{empty}&#10;\begin{document}&#10;&#10;&#10;$E(Y) = c(i,j)$&#10;&#10;\end{document}"/>
+  <p:tag name="IGUANATEXSIZE" val="20"/>
+  <p:tag name="IGUANATEXCURSOR" val="97"/>
+  <p:tag name="TRANSPARENCY" val="True"/>
+  <p:tag name="FILENAME" val=""/>
+  <p:tag name="LATEXENGINEID" val="0"/>
+  <p:tag name="TEMPFOLDER" val="c:\temp\"/>
+  <p:tag name="LATEXFORMHEIGHT" val="312"/>
+  <p:tag name="LATEXFORMWIDTH" val="384"/>
+  <p:tag name="LATEXFORMWRAP" val="True"/>
+  <p:tag name="BITMAPVECTOR" val="0"/>
+</p:tagLst>
+</file>
+
+<file path=ppt/tags/tag69.xml><?xml version="1.0" encoding="utf-8"?>
+<p:tagLst xmlns:a="http://schemas.openxmlformats.org/drawingml/2006/main" xmlns:r="http://schemas.openxmlformats.org/officeDocument/2006/relationships" xmlns:p="http://schemas.openxmlformats.org/presentationml/2006/main">
+  <p:tag name="OUTPUTDPI" val="1200"/>
+  <p:tag name="ORIGINALHEIGHT" val="137.9828"/>
+  <p:tag name="ORIGINALWIDTH" val="1496.813"/>
+  <p:tag name="LATEXADDIN" val="\documentclass{article}&#10;\usepackage{amsmath}&#10;\usepackage{amssymb}&#10;\pagestyle{empty}&#10;\begin{document}&#10;&#10;$\Pr\left[X = Y\right] = p \triangleq \mathrm{ep}(i\rightarrow j)$&#10;&#10;&#10;\end{document}"/>
+  <p:tag name="IGUANATEXSIZE" val="20"/>
+  <p:tag name="IGUANATEXCURSOR" val="65"/>
   <p:tag name="TRANSPARENCY" val="True"/>
   <p:tag name="FILENAME" val=""/>
   <p:tag name="LATEXENGINEID" val="0"/>
@@ -36446,44 +36467,6 @@
 <p:tagLst xmlns:a="http://schemas.openxmlformats.org/drawingml/2006/main" xmlns:r="http://schemas.openxmlformats.org/officeDocument/2006/relationships" xmlns:p="http://schemas.openxmlformats.org/presentationml/2006/main">
   <p:tag name="OUTPUTDPI" val="1200"/>
   <p:tag name="ORIGINALHEIGHT" val="123.7346"/>
-  <p:tag name="ORIGINALWIDTH" val="752.156"/>
-  <p:tag name="LATEXADDIN" val="\documentclass{article}&#10;\usepackage{amsmath}&#10;\pagestyle{empty}&#10;\begin{document}&#10;&#10;&#10;$E(Y) = c(i,j)$&#10;&#10;\end{document}"/>
-  <p:tag name="IGUANATEXSIZE" val="20"/>
-  <p:tag name="IGUANATEXCURSOR" val="97"/>
-  <p:tag name="TRANSPARENCY" val="True"/>
-  <p:tag name="FILENAME" val=""/>
-  <p:tag name="LATEXENGINEID" val="0"/>
-  <p:tag name="TEMPFOLDER" val="c:\temp\"/>
-  <p:tag name="LATEXFORMHEIGHT" val="312"/>
-  <p:tag name="LATEXFORMWIDTH" val="384"/>
-  <p:tag name="LATEXFORMWRAP" val="True"/>
-  <p:tag name="BITMAPVECTOR" val="0"/>
-</p:tagLst>
-</file>
-
-<file path=ppt/tags/tag71.xml><?xml version="1.0" encoding="utf-8"?>
-<p:tagLst xmlns:a="http://schemas.openxmlformats.org/drawingml/2006/main" xmlns:r="http://schemas.openxmlformats.org/officeDocument/2006/relationships" xmlns:p="http://schemas.openxmlformats.org/presentationml/2006/main">
-  <p:tag name="OUTPUTDPI" val="1200"/>
-  <p:tag name="ORIGINALHEIGHT" val="137.9828"/>
-  <p:tag name="ORIGINALWIDTH" val="1496.813"/>
-  <p:tag name="LATEXADDIN" val="\documentclass{article}&#10;\usepackage{amsmath}&#10;\usepackage{amssymb}&#10;\pagestyle{empty}&#10;\begin{document}&#10;&#10;$\Pr\left[X = Y\right] = p \triangleq \mathrm{ep}(i\rightarrow j)$&#10;&#10;&#10;\end{document}"/>
-  <p:tag name="IGUANATEXSIZE" val="20"/>
-  <p:tag name="IGUANATEXCURSOR" val="65"/>
-  <p:tag name="TRANSPARENCY" val="True"/>
-  <p:tag name="FILENAME" val=""/>
-  <p:tag name="LATEXENGINEID" val="0"/>
-  <p:tag name="TEMPFOLDER" val="c:\temp\"/>
-  <p:tag name="LATEXFORMHEIGHT" val="312"/>
-  <p:tag name="LATEXFORMWIDTH" val="384"/>
-  <p:tag name="LATEXFORMWRAP" val="True"/>
-  <p:tag name="BITMAPVECTOR" val="0"/>
-</p:tagLst>
-</file>
-
-<file path=ppt/tags/tag72.xml><?xml version="1.0" encoding="utf-8"?>
-<p:tagLst xmlns:a="http://schemas.openxmlformats.org/drawingml/2006/main" xmlns:r="http://schemas.openxmlformats.org/officeDocument/2006/relationships" xmlns:p="http://schemas.openxmlformats.org/presentationml/2006/main">
-  <p:tag name="OUTPUTDPI" val="1200"/>
-  <p:tag name="ORIGINALHEIGHT" val="123.7346"/>
   <p:tag name="ORIGINALWIDTH" val="2683.915"/>
   <p:tag name="LATEXADDIN" val="\documentclass{article}&#10;\usepackage{amsmath}&#10;\pagestyle{empty}&#10;\begin{document}&#10;&#10;$E(Y - X) = p\cdot 0 + (1 - p)\cdot E(Y) = (1-p) c(i,j)$&#10;&#10;&#10;\end{document}"/>
   <p:tag name="IGUANATEXSIZE" val="18"/>
@@ -36499,7 +36482,7 @@
 </p:tagLst>
 </file>
 
-<file path=ppt/tags/tag73.xml><?xml version="1.0" encoding="utf-8"?>
+<file path=ppt/tags/tag71.xml><?xml version="1.0" encoding="utf-8"?>
 <p:tagLst xmlns:a="http://schemas.openxmlformats.org/drawingml/2006/main" xmlns:r="http://schemas.openxmlformats.org/officeDocument/2006/relationships" xmlns:p="http://schemas.openxmlformats.org/presentationml/2006/main">
   <p:tag name="OUTPUTDPI" val="1200"/>
   <p:tag name="ORIGINALHEIGHT" val="163.4795"/>
@@ -36518,13 +36501,13 @@
 </p:tagLst>
 </file>
 
-<file path=ppt/tags/tag74.xml><?xml version="1.0" encoding="utf-8"?>
+<file path=ppt/tags/tag72.xml><?xml version="1.0" encoding="utf-8"?>
 <p:tagLst xmlns:a="http://schemas.openxmlformats.org/drawingml/2006/main" xmlns:r="http://schemas.openxmlformats.org/officeDocument/2006/relationships" xmlns:p="http://schemas.openxmlformats.org/presentationml/2006/main">
   <p:tag name="TIMING" val="|14.6"/>
 </p:tagLst>
 </file>
 
-<file path=ppt/tags/tag75.xml><?xml version="1.0" encoding="utf-8"?>
+<file path=ppt/tags/tag73.xml><?xml version="1.0" encoding="utf-8"?>
 <p:tagLst xmlns:a="http://schemas.openxmlformats.org/drawingml/2006/main" xmlns:r="http://schemas.openxmlformats.org/officeDocument/2006/relationships" xmlns:p="http://schemas.openxmlformats.org/presentationml/2006/main">
   <p:tag name="OUTPUTDPI" val="1200"/>
   <p:tag name="ORIGINALHEIGHT" val="156.7712"/>
@@ -36543,7 +36526,7 @@
 </p:tagLst>
 </file>
 
-<file path=ppt/tags/tag76.xml><?xml version="1.0" encoding="utf-8"?>
+<file path=ppt/tags/tag74.xml><?xml version="1.0" encoding="utf-8"?>
 <p:tagLst xmlns:a="http://schemas.openxmlformats.org/drawingml/2006/main" xmlns:r="http://schemas.openxmlformats.org/officeDocument/2006/relationships" xmlns:p="http://schemas.openxmlformats.org/presentationml/2006/main">
   <p:tag name="OUTPUTDPI" val="1200"/>
   <p:tag name="ORIGINALHEIGHT" val="224.222"/>
@@ -36562,7 +36545,7 @@
 </p:tagLst>
 </file>
 
-<file path=ppt/tags/tag77.xml><?xml version="1.0" encoding="utf-8"?>
+<file path=ppt/tags/tag75.xml><?xml version="1.0" encoding="utf-8"?>
 <p:tagLst xmlns:a="http://schemas.openxmlformats.org/drawingml/2006/main" xmlns:r="http://schemas.openxmlformats.org/officeDocument/2006/relationships" xmlns:p="http://schemas.openxmlformats.org/presentationml/2006/main">
   <p:tag name="OUTPUTDPI" val="1200"/>
   <p:tag name="ORIGINALHEIGHT" val="123.7346"/>
@@ -36581,7 +36564,7 @@
 </p:tagLst>
 </file>
 
-<file path=ppt/tags/tag78.xml><?xml version="1.0" encoding="utf-8"?>
+<file path=ppt/tags/tag76.xml><?xml version="1.0" encoding="utf-8"?>
 <p:tagLst xmlns:a="http://schemas.openxmlformats.org/drawingml/2006/main" xmlns:r="http://schemas.openxmlformats.org/officeDocument/2006/relationships" xmlns:p="http://schemas.openxmlformats.org/presentationml/2006/main">
   <p:tag name="OUTPUTDPI" val="1200"/>
   <p:tag name="ORIGINALHEIGHT" val="89.98874"/>

</xml_diff>

<commit_message>
added animationss in proofs
</commit_message>
<xml_diff>
--- a/Random Walk based Proximity Measures in Directed Graphs.pptx
+++ b/Random Walk based Proximity Measures in Directed Graphs.pptx
@@ -7035,7 +7035,7 @@
           <a:graphicData uri="http://schemas.openxmlformats.org/presentationml/2006/ole">
             <mc:AlternateContent xmlns:mc="http://schemas.openxmlformats.org/markup-compatibility/2006">
               <mc:Choice xmlns:v="urn:schemas-microsoft-com:vml" Requires="v">
-                <p:oleObj spid="_x0000_s28128" name="Visio" r:id="rId9" imgW="5289194" imgH="1988515" progId="Visio.Drawing.11">
+                <p:oleObj spid="_x0000_s28160" name="Visio" r:id="rId9" imgW="5289194" imgH="1988515" progId="Visio.Drawing.11">
                   <p:embed/>
                 </p:oleObj>
               </mc:Choice>
@@ -7137,7 +7137,7 @@
           <a:graphicData uri="http://schemas.openxmlformats.org/presentationml/2006/ole">
             <mc:AlternateContent xmlns:mc="http://schemas.openxmlformats.org/markup-compatibility/2006">
               <mc:Choice xmlns:v="urn:schemas-microsoft-com:vml" Requires="v">
-                <p:oleObj spid="_x0000_s28129" name="Visio" r:id="rId11" imgW="5289194" imgH="2888590" progId="Visio.Drawing.11">
+                <p:oleObj spid="_x0000_s28161" name="Visio" r:id="rId11" imgW="5289194" imgH="2888590" progId="Visio.Drawing.11">
                   <p:embed/>
                 </p:oleObj>
               </mc:Choice>
@@ -7238,7 +7238,7 @@
           <a:graphicData uri="http://schemas.openxmlformats.org/presentationml/2006/ole">
             <mc:AlternateContent xmlns:mc="http://schemas.openxmlformats.org/markup-compatibility/2006">
               <mc:Choice xmlns:v="urn:schemas-microsoft-com:vml" Requires="v">
-                <p:oleObj spid="_x0000_s28130" name="Visio" r:id="rId13" imgW="5186172" imgH="754685" progId="Visio.Drawing.11">
+                <p:oleObj spid="_x0000_s28162" name="Visio" r:id="rId13" imgW="5186172" imgH="754685" progId="Visio.Drawing.11">
                   <p:embed/>
                 </p:oleObj>
               </mc:Choice>
@@ -7339,7 +7339,7 @@
           <a:graphicData uri="http://schemas.openxmlformats.org/presentationml/2006/ole">
             <mc:AlternateContent xmlns:mc="http://schemas.openxmlformats.org/markup-compatibility/2006">
               <mc:Choice xmlns:v="urn:schemas-microsoft-com:vml" Requires="v">
-                <p:oleObj spid="_x0000_s28131" name="Visio" r:id="rId15" imgW="5186172" imgH="1870558" progId="Visio.Drawing.11">
+                <p:oleObj spid="_x0000_s28163" name="Visio" r:id="rId15" imgW="5186172" imgH="1870558" progId="Visio.Drawing.11">
                   <p:embed/>
                 </p:oleObj>
               </mc:Choice>
@@ -8571,7 +8571,7 @@
           <a:graphicData uri="http://schemas.openxmlformats.org/presentationml/2006/ole">
             <mc:AlternateContent xmlns:mc="http://schemas.openxmlformats.org/markup-compatibility/2006">
               <mc:Choice xmlns:v="urn:schemas-microsoft-com:vml" Requires="v">
-                <p:oleObj spid="_x0000_s1658" name="Visio" r:id="rId7" imgW="5038954" imgH="751637" progId="Visio.Drawing.11">
+                <p:oleObj spid="_x0000_s1674" name="Visio" r:id="rId7" imgW="5038954" imgH="751637" progId="Visio.Drawing.11">
                   <p:embed/>
                 </p:oleObj>
               </mc:Choice>
@@ -8726,7 +8726,7 @@
           <a:graphicData uri="http://schemas.openxmlformats.org/presentationml/2006/ole">
             <mc:AlternateContent xmlns:mc="http://schemas.openxmlformats.org/markup-compatibility/2006">
               <mc:Choice xmlns:v="urn:schemas-microsoft-com:vml" Requires="v">
-                <p:oleObj spid="_x0000_s1659" name="Visio" r:id="rId9" imgW="5038954" imgH="1130503" progId="Visio.Drawing.11">
+                <p:oleObj spid="_x0000_s1675" name="Visio" r:id="rId9" imgW="5038954" imgH="1130503" progId="Visio.Drawing.11">
                   <p:embed/>
                 </p:oleObj>
               </mc:Choice>
@@ -25284,7 +25284,7 @@
                             </p:stCondLst>
                             <p:childTnLst>
                               <p:par>
-                                <p:cTn id="5" presetID="1" presetClass="entr" presetSubtype="0" fill="hold" grpId="0" nodeType="clickEffect">
+                                <p:cTn id="5" presetID="1" presetClass="entr" presetSubtype="0" fill="hold" nodeType="clickEffect">
                                   <p:stCondLst>
                                     <p:cond delay="0"/>
                                   </p:stCondLst>
@@ -25315,7 +25315,7 @@
                                 </p:cTn>
                               </p:par>
                               <p:par>
-                                <p:cTn id="7" presetID="1" presetClass="entr" presetSubtype="0" fill="hold" grpId="0" nodeType="withEffect">
+                                <p:cTn id="7" presetID="1" presetClass="entr" presetSubtype="0" fill="hold" nodeType="withEffect">
                                   <p:stCondLst>
                                     <p:cond delay="0"/>
                                   </p:stCondLst>
@@ -25346,7 +25346,7 @@
                                 </p:cTn>
                               </p:par>
                               <p:par>
-                                <p:cTn id="9" presetID="1" presetClass="entr" presetSubtype="0" fill="hold" grpId="0" nodeType="withEffect">
+                                <p:cTn id="9" presetID="1" presetClass="entr" presetSubtype="0" fill="hold" nodeType="withEffect">
                                   <p:stCondLst>
                                     <p:cond delay="0"/>
                                   </p:stCondLst>
@@ -25377,7 +25377,7 @@
                                 </p:cTn>
                               </p:par>
                               <p:par>
-                                <p:cTn id="11" presetID="1" presetClass="entr" presetSubtype="0" fill="hold" grpId="0" nodeType="withEffect">
+                                <p:cTn id="11" presetID="1" presetClass="entr" presetSubtype="0" fill="hold" nodeType="withEffect">
                                   <p:stCondLst>
                                     <p:cond delay="0"/>
                                   </p:stCondLst>
@@ -25408,7 +25408,7 @@
                                 </p:cTn>
                               </p:par>
                               <p:par>
-                                <p:cTn id="13" presetID="1" presetClass="entr" presetSubtype="0" fill="hold" grpId="0" nodeType="withEffect">
+                                <p:cTn id="13" presetID="1" presetClass="entr" presetSubtype="0" fill="hold" nodeType="withEffect">
                                   <p:stCondLst>
                                     <p:cond delay="0"/>
                                   </p:stCondLst>
@@ -25421,11 +25421,7 @@
                                           </p:stCondLst>
                                         </p:cTn>
                                         <p:tgtEl>
-                                          <p:spTgt spid="2">
-                                            <p:txEl>
-                                              <p:pRg st="5" end="5"/>
-                                            </p:txEl>
-                                          </p:spTgt>
+                                          <p:spTgt spid="4"/>
                                         </p:tgtEl>
                                         <p:attrNameLst>
                                           <p:attrName>style.visibility</p:attrName>
@@ -25452,7 +25448,7 @@
                                           </p:stCondLst>
                                         </p:cTn>
                                         <p:tgtEl>
-                                          <p:spTgt spid="4"/>
+                                          <p:spTgt spid="7"/>
                                         </p:tgtEl>
                                         <p:attrNameLst>
                                           <p:attrName>style.visibility</p:attrName>
@@ -25479,7 +25475,7 @@
                                           </p:stCondLst>
                                         </p:cTn>
                                         <p:tgtEl>
-                                          <p:spTgt spid="7"/>
+                                          <p:spTgt spid="8"/>
                                         </p:tgtEl>
                                         <p:attrNameLst>
                                           <p:attrName>style.visibility</p:attrName>
@@ -25492,21 +25488,43 @@
                                   </p:childTnLst>
                                 </p:cTn>
                               </p:par>
+                            </p:childTnLst>
+                          </p:cTn>
+                        </p:par>
+                      </p:childTnLst>
+                    </p:cTn>
+                  </p:par>
+                  <p:par>
+                    <p:cTn id="19" fill="hold">
+                      <p:stCondLst>
+                        <p:cond delay="indefinite"/>
+                      </p:stCondLst>
+                      <p:childTnLst>
+                        <p:par>
+                          <p:cTn id="20" fill="hold">
+                            <p:stCondLst>
+                              <p:cond delay="0"/>
+                            </p:stCondLst>
+                            <p:childTnLst>
                               <p:par>
-                                <p:cTn id="19" presetID="1" presetClass="entr" presetSubtype="0" fill="hold" nodeType="withEffect">
+                                <p:cTn id="21" presetID="1" presetClass="entr" presetSubtype="0" fill="hold" nodeType="clickEffect">
                                   <p:stCondLst>
                                     <p:cond delay="0"/>
                                   </p:stCondLst>
                                   <p:childTnLst>
                                     <p:set>
                                       <p:cBhvr>
-                                        <p:cTn id="20" dur="1" fill="hold">
+                                        <p:cTn id="22" dur="1" fill="hold">
                                           <p:stCondLst>
                                             <p:cond delay="0"/>
                                           </p:stCondLst>
                                         </p:cTn>
                                         <p:tgtEl>
-                                          <p:spTgt spid="8"/>
+                                          <p:spTgt spid="2">
+                                            <p:txEl>
+                                              <p:pRg st="5" end="5"/>
+                                            </p:txEl>
+                                          </p:spTgt>
                                         </p:tgtEl>
                                         <p:attrNameLst>
                                           <p:attrName>style.visibility</p:attrName>
@@ -25546,9 +25564,6 @@
         </p:cTn>
       </p:par>
     </p:tnLst>
-    <p:bldLst>
-      <p:bldP spid="2" grpId="0" uiExpand="1" build="p"/>
-    </p:bldLst>
   </p:timing>
 </p:sld>
 </file>
@@ -26500,7 +26515,11 @@
                                           </p:stCondLst>
                                         </p:cTn>
                                         <p:tgtEl>
-                                          <p:spTgt spid="6"/>
+                                          <p:spTgt spid="9">
+                                            <p:txEl>
+                                              <p:pRg st="0" end="0"/>
+                                            </p:txEl>
+                                          </p:spTgt>
                                         </p:tgtEl>
                                         <p:attrNameLst>
                                           <p:attrName>style.visibility</p:attrName>
@@ -26527,7 +26546,11 @@
                                           </p:stCondLst>
                                         </p:cTn>
                                         <p:tgtEl>
-                                          <p:spTgt spid="8"/>
+                                          <p:spTgt spid="9">
+                                            <p:txEl>
+                                              <p:pRg st="1" end="1"/>
+                                            </p:txEl>
+                                          </p:spTgt>
                                         </p:tgtEl>
                                         <p:attrNameLst>
                                           <p:attrName>style.visibility</p:attrName>
@@ -26554,7 +26577,11 @@
                                           </p:stCondLst>
                                         </p:cTn>
                                         <p:tgtEl>
-                                          <p:spTgt spid="10"/>
+                                          <p:spTgt spid="9">
+                                            <p:txEl>
+                                              <p:pRg st="2" end="2"/>
+                                            </p:txEl>
+                                          </p:spTgt>
                                         </p:tgtEl>
                                         <p:attrNameLst>
                                           <p:attrName>style.visibility</p:attrName>
@@ -26581,7 +26608,11 @@
                                           </p:stCondLst>
                                         </p:cTn>
                                         <p:tgtEl>
-                                          <p:spTgt spid="11"/>
+                                          <p:spTgt spid="9">
+                                            <p:txEl>
+                                              <p:pRg st="3" end="3"/>
+                                            </p:txEl>
+                                          </p:spTgt>
                                         </p:tgtEl>
                                         <p:attrNameLst>
                                           <p:attrName>style.visibility</p:attrName>
@@ -26608,157 +26639,6 @@
                                           </p:stCondLst>
                                         </p:cTn>
                                         <p:tgtEl>
-                                          <p:spTgt spid="12"/>
-                                        </p:tgtEl>
-                                        <p:attrNameLst>
-                                          <p:attrName>style.visibility</p:attrName>
-                                        </p:attrNameLst>
-                                      </p:cBhvr>
-                                      <p:to>
-                                        <p:strVal val="visible"/>
-                                      </p:to>
-                                    </p:set>
-                                  </p:childTnLst>
-                                </p:cTn>
-                              </p:par>
-                              <p:par>
-                                <p:cTn id="15" presetID="1" presetClass="entr" presetSubtype="0" fill="hold" grpId="0" nodeType="withEffect">
-                                  <p:stCondLst>
-                                    <p:cond delay="0"/>
-                                  </p:stCondLst>
-                                  <p:childTnLst>
-                                    <p:set>
-                                      <p:cBhvr>
-                                        <p:cTn id="16" dur="1" fill="hold">
-                                          <p:stCondLst>
-                                            <p:cond delay="0"/>
-                                          </p:stCondLst>
-                                        </p:cTn>
-                                        <p:tgtEl>
-                                          <p:spTgt spid="9">
-                                            <p:txEl>
-                                              <p:pRg st="0" end="0"/>
-                                            </p:txEl>
-                                          </p:spTgt>
-                                        </p:tgtEl>
-                                        <p:attrNameLst>
-                                          <p:attrName>style.visibility</p:attrName>
-                                        </p:attrNameLst>
-                                      </p:cBhvr>
-                                      <p:to>
-                                        <p:strVal val="visible"/>
-                                      </p:to>
-                                    </p:set>
-                                  </p:childTnLst>
-                                </p:cTn>
-                              </p:par>
-                              <p:par>
-                                <p:cTn id="17" presetID="1" presetClass="entr" presetSubtype="0" fill="hold" grpId="0" nodeType="withEffect">
-                                  <p:stCondLst>
-                                    <p:cond delay="0"/>
-                                  </p:stCondLst>
-                                  <p:childTnLst>
-                                    <p:set>
-                                      <p:cBhvr>
-                                        <p:cTn id="18" dur="1" fill="hold">
-                                          <p:stCondLst>
-                                            <p:cond delay="0"/>
-                                          </p:stCondLst>
-                                        </p:cTn>
-                                        <p:tgtEl>
-                                          <p:spTgt spid="9">
-                                            <p:txEl>
-                                              <p:pRg st="1" end="1"/>
-                                            </p:txEl>
-                                          </p:spTgt>
-                                        </p:tgtEl>
-                                        <p:attrNameLst>
-                                          <p:attrName>style.visibility</p:attrName>
-                                        </p:attrNameLst>
-                                      </p:cBhvr>
-                                      <p:to>
-                                        <p:strVal val="visible"/>
-                                      </p:to>
-                                    </p:set>
-                                  </p:childTnLst>
-                                </p:cTn>
-                              </p:par>
-                              <p:par>
-                                <p:cTn id="19" presetID="1" presetClass="entr" presetSubtype="0" fill="hold" grpId="0" nodeType="withEffect">
-                                  <p:stCondLst>
-                                    <p:cond delay="0"/>
-                                  </p:stCondLst>
-                                  <p:childTnLst>
-                                    <p:set>
-                                      <p:cBhvr>
-                                        <p:cTn id="20" dur="1" fill="hold">
-                                          <p:stCondLst>
-                                            <p:cond delay="0"/>
-                                          </p:stCondLst>
-                                        </p:cTn>
-                                        <p:tgtEl>
-                                          <p:spTgt spid="9">
-                                            <p:txEl>
-                                              <p:pRg st="2" end="2"/>
-                                            </p:txEl>
-                                          </p:spTgt>
-                                        </p:tgtEl>
-                                        <p:attrNameLst>
-                                          <p:attrName>style.visibility</p:attrName>
-                                        </p:attrNameLst>
-                                      </p:cBhvr>
-                                      <p:to>
-                                        <p:strVal val="visible"/>
-                                      </p:to>
-                                    </p:set>
-                                  </p:childTnLst>
-                                </p:cTn>
-                              </p:par>
-                              <p:par>
-                                <p:cTn id="21" presetID="1" presetClass="entr" presetSubtype="0" fill="hold" grpId="0" nodeType="withEffect">
-                                  <p:stCondLst>
-                                    <p:cond delay="0"/>
-                                  </p:stCondLst>
-                                  <p:childTnLst>
-                                    <p:set>
-                                      <p:cBhvr>
-                                        <p:cTn id="22" dur="1" fill="hold">
-                                          <p:stCondLst>
-                                            <p:cond delay="0"/>
-                                          </p:stCondLst>
-                                        </p:cTn>
-                                        <p:tgtEl>
-                                          <p:spTgt spid="9">
-                                            <p:txEl>
-                                              <p:pRg st="3" end="3"/>
-                                            </p:txEl>
-                                          </p:spTgt>
-                                        </p:tgtEl>
-                                        <p:attrNameLst>
-                                          <p:attrName>style.visibility</p:attrName>
-                                        </p:attrNameLst>
-                                      </p:cBhvr>
-                                      <p:to>
-                                        <p:strVal val="visible"/>
-                                      </p:to>
-                                    </p:set>
-                                  </p:childTnLst>
-                                </p:cTn>
-                              </p:par>
-                              <p:par>
-                                <p:cTn id="23" presetID="1" presetClass="entr" presetSubtype="0" fill="hold" grpId="0" nodeType="withEffect">
-                                  <p:stCondLst>
-                                    <p:cond delay="0"/>
-                                  </p:stCondLst>
-                                  <p:childTnLst>
-                                    <p:set>
-                                      <p:cBhvr>
-                                        <p:cTn id="24" dur="1" fill="hold">
-                                          <p:stCondLst>
-                                            <p:cond delay="0"/>
-                                          </p:stCondLst>
-                                        </p:cTn>
-                                        <p:tgtEl>
                                           <p:spTgt spid="9">
                                             <p:txEl>
                                               <p:pRg st="4" end="4"/>
@@ -26777,14 +26657,86 @@
                                 </p:cTn>
                               </p:par>
                               <p:par>
-                                <p:cTn id="25" presetID="1" presetClass="entr" presetSubtype="0" fill="hold" grpId="0" nodeType="withEffect">
+                                <p:cTn id="15" presetID="1" presetClass="entr" presetSubtype="0" fill="hold" nodeType="withEffect">
                                   <p:stCondLst>
                                     <p:cond delay="0"/>
                                   </p:stCondLst>
                                   <p:childTnLst>
                                     <p:set>
                                       <p:cBhvr>
-                                        <p:cTn id="26" dur="1" fill="hold">
+                                        <p:cTn id="16" dur="1" fill="hold">
+                                          <p:stCondLst>
+                                            <p:cond delay="0"/>
+                                          </p:stCondLst>
+                                        </p:cTn>
+                                        <p:tgtEl>
+                                          <p:spTgt spid="6"/>
+                                        </p:tgtEl>
+                                        <p:attrNameLst>
+                                          <p:attrName>style.visibility</p:attrName>
+                                        </p:attrNameLst>
+                                      </p:cBhvr>
+                                      <p:to>
+                                        <p:strVal val="visible"/>
+                                      </p:to>
+                                    </p:set>
+                                  </p:childTnLst>
+                                </p:cTn>
+                              </p:par>
+                              <p:par>
+                                <p:cTn id="17" presetID="1" presetClass="entr" presetSubtype="0" fill="hold" nodeType="withEffect">
+                                  <p:stCondLst>
+                                    <p:cond delay="0"/>
+                                  </p:stCondLst>
+                                  <p:childTnLst>
+                                    <p:set>
+                                      <p:cBhvr>
+                                        <p:cTn id="18" dur="1" fill="hold">
+                                          <p:stCondLst>
+                                            <p:cond delay="0"/>
+                                          </p:stCondLst>
+                                        </p:cTn>
+                                        <p:tgtEl>
+                                          <p:spTgt spid="8"/>
+                                        </p:tgtEl>
+                                        <p:attrNameLst>
+                                          <p:attrName>style.visibility</p:attrName>
+                                        </p:attrNameLst>
+                                      </p:cBhvr>
+                                      <p:to>
+                                        <p:strVal val="visible"/>
+                                      </p:to>
+                                    </p:set>
+                                  </p:childTnLst>
+                                </p:cTn>
+                              </p:par>
+                            </p:childTnLst>
+                          </p:cTn>
+                        </p:par>
+                      </p:childTnLst>
+                    </p:cTn>
+                  </p:par>
+                  <p:par>
+                    <p:cTn id="19" fill="hold">
+                      <p:stCondLst>
+                        <p:cond delay="indefinite"/>
+                      </p:stCondLst>
+                      <p:childTnLst>
+                        <p:par>
+                          <p:cTn id="20" fill="hold">
+                            <p:stCondLst>
+                              <p:cond delay="0"/>
+                            </p:stCondLst>
+                            <p:childTnLst>
+                              <p:par>
+                                <p:cTn id="21" presetID="1" presetClass="entr" presetSubtype="0" fill="hold" nodeType="clickEffect">
+                                  <p:stCondLst>
+                                    <p:cond delay="0"/>
+                                  </p:stCondLst>
+                                  <p:childTnLst>
+                                    <p:set>
+                                      <p:cBhvr>
+                                        <p:cTn id="22" dur="1" fill="hold">
                                           <p:stCondLst>
                                             <p:cond delay="0"/>
                                           </p:stCondLst>
@@ -26808,7 +26760,52 @@
                                 </p:cTn>
                               </p:par>
                               <p:par>
-                                <p:cTn id="27" presetID="1" presetClass="entr" presetSubtype="0" fill="hold" grpId="0" nodeType="withEffect">
+                                <p:cTn id="23" presetID="1" presetClass="entr" presetSubtype="0" fill="hold" nodeType="withEffect">
+                                  <p:stCondLst>
+                                    <p:cond delay="0"/>
+                                  </p:stCondLst>
+                                  <p:childTnLst>
+                                    <p:set>
+                                      <p:cBhvr>
+                                        <p:cTn id="24" dur="1" fill="hold">
+                                          <p:stCondLst>
+                                            <p:cond delay="0"/>
+                                          </p:stCondLst>
+                                        </p:cTn>
+                                        <p:tgtEl>
+                                          <p:spTgt spid="10"/>
+                                        </p:tgtEl>
+                                        <p:attrNameLst>
+                                          <p:attrName>style.visibility</p:attrName>
+                                        </p:attrNameLst>
+                                      </p:cBhvr>
+                                      <p:to>
+                                        <p:strVal val="visible"/>
+                                      </p:to>
+                                    </p:set>
+                                  </p:childTnLst>
+                                </p:cTn>
+                              </p:par>
+                            </p:childTnLst>
+                          </p:cTn>
+                        </p:par>
+                      </p:childTnLst>
+                    </p:cTn>
+                  </p:par>
+                  <p:par>
+                    <p:cTn id="25" fill="hold">
+                      <p:stCondLst>
+                        <p:cond delay="indefinite"/>
+                      </p:stCondLst>
+                      <p:childTnLst>
+                        <p:par>
+                          <p:cTn id="26" fill="hold">
+                            <p:stCondLst>
+                              <p:cond delay="0"/>
+                            </p:stCondLst>
+                            <p:childTnLst>
+                              <p:par>
+                                <p:cTn id="27" presetID="1" presetClass="entr" presetSubtype="0" fill="hold" nodeType="clickEffect">
                                   <p:stCondLst>
                                     <p:cond delay="0"/>
                                   </p:stCondLst>
@@ -26839,7 +26836,7 @@
                                 </p:cTn>
                               </p:par>
                               <p:par>
-                                <p:cTn id="29" presetID="1" presetClass="entr" presetSubtype="0" fill="hold" grpId="0" nodeType="withEffect">
+                                <p:cTn id="29" presetID="1" presetClass="entr" presetSubtype="0" fill="hold" nodeType="withEffect">
                                   <p:stCondLst>
                                     <p:cond delay="0"/>
                                   </p:stCondLst>
@@ -26852,11 +26849,83 @@
                                           </p:stCondLst>
                                         </p:cTn>
                                         <p:tgtEl>
+                                          <p:spTgt spid="11"/>
+                                        </p:tgtEl>
+                                        <p:attrNameLst>
+                                          <p:attrName>style.visibility</p:attrName>
+                                        </p:attrNameLst>
+                                      </p:cBhvr>
+                                      <p:to>
+                                        <p:strVal val="visible"/>
+                                      </p:to>
+                                    </p:set>
+                                  </p:childTnLst>
+                                </p:cTn>
+                              </p:par>
+                            </p:childTnLst>
+                          </p:cTn>
+                        </p:par>
+                      </p:childTnLst>
+                    </p:cTn>
+                  </p:par>
+                  <p:par>
+                    <p:cTn id="31" fill="hold">
+                      <p:stCondLst>
+                        <p:cond delay="indefinite"/>
+                      </p:stCondLst>
+                      <p:childTnLst>
+                        <p:par>
+                          <p:cTn id="32" fill="hold">
+                            <p:stCondLst>
+                              <p:cond delay="0"/>
+                            </p:stCondLst>
+                            <p:childTnLst>
+                              <p:par>
+                                <p:cTn id="33" presetID="1" presetClass="entr" presetSubtype="0" fill="hold" nodeType="clickEffect">
+                                  <p:stCondLst>
+                                    <p:cond delay="0"/>
+                                  </p:stCondLst>
+                                  <p:childTnLst>
+                                    <p:set>
+                                      <p:cBhvr>
+                                        <p:cTn id="34" dur="1" fill="hold">
+                                          <p:stCondLst>
+                                            <p:cond delay="0"/>
+                                          </p:stCondLst>
+                                        </p:cTn>
+                                        <p:tgtEl>
                                           <p:spTgt spid="9">
                                             <p:txEl>
                                               <p:pRg st="7" end="7"/>
                                             </p:txEl>
                                           </p:spTgt>
+                                        </p:tgtEl>
+                                        <p:attrNameLst>
+                                          <p:attrName>style.visibility</p:attrName>
+                                        </p:attrNameLst>
+                                      </p:cBhvr>
+                                      <p:to>
+                                        <p:strVal val="visible"/>
+                                      </p:to>
+                                    </p:set>
+                                  </p:childTnLst>
+                                </p:cTn>
+                              </p:par>
+                              <p:par>
+                                <p:cTn id="35" presetID="1" presetClass="entr" presetSubtype="0" fill="hold" nodeType="withEffect">
+                                  <p:stCondLst>
+                                    <p:cond delay="0"/>
+                                  </p:stCondLst>
+                                  <p:childTnLst>
+                                    <p:set>
+                                      <p:cBhvr>
+                                        <p:cTn id="36" dur="1" fill="hold">
+                                          <p:stCondLst>
+                                            <p:cond delay="0"/>
+                                          </p:stCondLst>
+                                        </p:cTn>
+                                        <p:tgtEl>
+                                          <p:spTgt spid="12"/>
                                         </p:tgtEl>
                                         <p:attrNameLst>
                                           <p:attrName>style.visibility</p:attrName>
@@ -26896,9 +26965,6 @@
         </p:cTn>
       </p:par>
     </p:tnLst>
-    <p:bldLst>
-      <p:bldP spid="9" grpId="0" build="p"/>
-    </p:bldLst>
   </p:timing>
 </p:sld>
 </file>
@@ -35172,7 +35238,7 @@
           <a:graphicData uri="http://schemas.openxmlformats.org/presentationml/2006/ole">
             <mc:AlternateContent xmlns:mc="http://schemas.openxmlformats.org/markup-compatibility/2006">
               <mc:Choice xmlns:v="urn:schemas-microsoft-com:vml" Requires="v">
-                <p:oleObj spid="_x0000_s9096" name="Visio" r:id="rId6" imgW="5289194" imgH="2914802" progId="Visio.Drawing.11">
+                <p:oleObj spid="_x0000_s9104" name="Visio" r:id="rId6" imgW="5289194" imgH="2914802" progId="Visio.Drawing.11">
                   <p:embed/>
                 </p:oleObj>
               </mc:Choice>

</xml_diff>